<commit_message>
coursework done, clips exp sys started
</commit_message>
<xml_diff>
--- a/sem 6/coursework/!presentation/coursework.pptx
+++ b/sem 6/coursework/!presentation/coursework.pptx
@@ -3,18 +3,19 @@
 <p:presentation xmlns:a="http://schemas.openxmlformats.org/drawingml/2006/main" xmlns:p="http://schemas.openxmlformats.org/presentationml/2006/main" xmlns:r="http://schemas.openxmlformats.org/officeDocument/2006/relationships" xmlns:p14="http://schemas.microsoft.com/office/powerpoint/2010/main" xmlns:p15="http://schemas.microsoft.com/office/powerpoint/2012/main" xmlns:mc="http://schemas.openxmlformats.org/markup-compatibility/2006">
   <p:sldMasterIdLst>
     <p:sldMasterId id="2147483648" r:id="rId2"/>
+    <p:sldMasterId id="2147483650" r:id="rId3"/>
   </p:sldMasterIdLst>
   <p:sldIdLst>
-    <p:sldId id="256" r:id="rId3"/>
-    <p:sldId id="257" r:id="rId4"/>
-    <p:sldId id="258" r:id="rId5"/>
-    <p:sldId id="259" r:id="rId6"/>
-    <p:sldId id="260" r:id="rId7"/>
-    <p:sldId id="261" r:id="rId8"/>
-    <p:sldId id="262" r:id="rId9"/>
-    <p:sldId id="263" r:id="rId10"/>
-    <p:sldId id="264" r:id="rId11"/>
-    <p:sldId id="265" r:id="rId12"/>
+    <p:sldId id="256" r:id="rId4"/>
+    <p:sldId id="257" r:id="rId5"/>
+    <p:sldId id="258" r:id="rId6"/>
+    <p:sldId id="259" r:id="rId7"/>
+    <p:sldId id="260" r:id="rId8"/>
+    <p:sldId id="261" r:id="rId9"/>
+    <p:sldId id="262" r:id="rId10"/>
+    <p:sldId id="263" r:id="rId11"/>
+    <p:sldId id="264" r:id="rId12"/>
+    <p:sldId id="265" r:id="rId13"/>
   </p:sldIdLst>
   <p:sldSz cx="10080625" cy="5670550"/>
   <p:notesSz cx="7772400" cy="10058400"/>
@@ -51,7 +52,7 @@
         <p:spPr>
           <a:xfrm>
             <a:off x="504000" y="226080"/>
-            <a:ext cx="9071640" cy="946440"/>
+            <a:ext cx="9070560" cy="945360"/>
           </a:xfrm>
           <a:prstGeom prst="rect">
             <a:avLst/>
@@ -69,11 +70,10 @@
             <a:pPr indent="0" algn="ctr">
               <a:buNone/>
             </a:pPr>
-            <a:endParaRPr b="0" lang="en-US" sz="4400" strike="noStrike" u="none">
-              <a:solidFill>
-                <a:srgbClr val="000000"/>
-              </a:solidFill>
-              <a:uFillTx/>
+            <a:endParaRPr b="0" lang="en-US" sz="4400" spc="-1" strike="noStrike">
+              <a:solidFill>
+                <a:srgbClr val="000000"/>
+              </a:solidFill>
               <a:latin typeface="Arial"/>
             </a:endParaRPr>
           </a:p>
@@ -92,7 +92,7 @@
         <p:spPr>
           <a:xfrm>
             <a:off x="504000" y="1326600"/>
-            <a:ext cx="9071640" cy="3288240"/>
+            <a:ext cx="9070560" cy="3287160"/>
           </a:xfrm>
           <a:prstGeom prst="rect">
             <a:avLst/>
@@ -113,11 +113,10 @@
               </a:spcBef>
               <a:buNone/>
             </a:pPr>
-            <a:endParaRPr b="0" lang="en-US" sz="3200" strike="noStrike" u="none">
-              <a:solidFill>
-                <a:srgbClr val="000000"/>
-              </a:solidFill>
-              <a:uFillTx/>
+            <a:endParaRPr b="0" lang="en-US" sz="3200" spc="-1" strike="noStrike">
+              <a:solidFill>
+                <a:srgbClr val="000000"/>
+              </a:solidFill>
               <a:latin typeface="Arial"/>
             </a:endParaRPr>
           </a:p>
@@ -130,7 +129,7 @@
             <a:spLocks noGrp="1"/>
           </p:cNvSpPr>
           <p:nvPr>
-            <p:ph type="ftr" idx="2"/>
+            <p:ph type="ftr" idx="1"/>
           </p:nvPr>
         </p:nvSpPr>
         <p:spPr/>
@@ -150,14 +149,14 @@
             <a:spLocks noGrp="1"/>
           </p:cNvSpPr>
           <p:nvPr>
-            <p:ph type="sldNum" idx="3"/>
+            <p:ph type="sldNum" idx="2"/>
           </p:nvPr>
         </p:nvSpPr>
         <p:spPr/>
         <p:txBody>
           <a:bodyPr/>
           <a:p>
-            <a:fld id="{8F8C399B-9AD6-430A-A9A5-65F9B1BC6F31}" type="slidenum">
+            <a:fld id="{B2A911B0-29B6-47FF-84CC-0BA5EE42471F}" type="slidenum">
               <a:t>&lt;#&gt;</a:t>
             </a:fld>
           </a:p>
@@ -170,7 +169,7 @@
             <a:spLocks noGrp="1"/>
           </p:cNvSpPr>
           <p:nvPr>
-            <p:ph type="dt" idx="1"/>
+            <p:ph type="dt" idx="3"/>
           </p:nvPr>
         </p:nvSpPr>
         <p:spPr/>
@@ -191,7 +190,7 @@
 
 <file path=ppt/slideLayouts/slideLayout2.xml><?xml version="1.0" encoding="utf-8"?>
 <p:sldLayout xmlns:a="http://schemas.openxmlformats.org/drawingml/2006/main" xmlns:p="http://schemas.openxmlformats.org/presentationml/2006/main" xmlns:r="http://schemas.openxmlformats.org/officeDocument/2006/relationships" xmlns:p14="http://schemas.microsoft.com/office/powerpoint/2010/main" xmlns:p15="http://schemas.microsoft.com/office/powerpoint/2012/main" xmlns:mc="http://schemas.openxmlformats.org/markup-compatibility/2006" type="title" preserve="1">
-  <p:cSld name="Default">
+  <p:cSld name="Default 1">
     <p:spTree>
       <p:nvGrpSpPr>
         <p:cNvPr id="1" name=""/>
@@ -208,7 +207,7 @@
       </p:grpSpPr>
       <p:sp>
         <p:nvSpPr>
-          <p:cNvPr id="7" name="PlaceHolder 1"/>
+          <p:cNvPr id="12" name="PlaceHolder 1"/>
           <p:cNvSpPr>
             <a:spLocks noGrp="1"/>
           </p:cNvSpPr>
@@ -219,7 +218,7 @@
         <p:spPr>
           <a:xfrm>
             <a:off x="504000" y="226080"/>
-            <a:ext cx="9071640" cy="946440"/>
+            <a:ext cx="9070560" cy="945360"/>
           </a:xfrm>
           <a:prstGeom prst="rect">
             <a:avLst/>
@@ -237,11 +236,10 @@
             <a:pPr indent="0" algn="ctr">
               <a:buNone/>
             </a:pPr>
-            <a:endParaRPr b="0" lang="en-US" sz="4400" strike="noStrike" u="none">
-              <a:solidFill>
-                <a:srgbClr val="000000"/>
-              </a:solidFill>
-              <a:uFillTx/>
+            <a:endParaRPr b="0" lang="en-US" sz="4400" spc="-1" strike="noStrike">
+              <a:solidFill>
+                <a:srgbClr val="000000"/>
+              </a:solidFill>
               <a:latin typeface="Arial"/>
             </a:endParaRPr>
           </a:p>
@@ -249,7 +247,7 @@
       </p:sp>
       <p:sp>
         <p:nvSpPr>
-          <p:cNvPr id="8" name="PlaceHolder 2"/>
+          <p:cNvPr id="13" name="PlaceHolder 2"/>
           <p:cNvSpPr>
             <a:spLocks noGrp="1"/>
           </p:cNvSpPr>
@@ -260,7 +258,7 @@
         <p:spPr>
           <a:xfrm>
             <a:off x="504000" y="1326600"/>
-            <a:ext cx="9071640" cy="3288240"/>
+            <a:ext cx="9070560" cy="3287160"/>
           </a:xfrm>
           <a:prstGeom prst="rect">
             <a:avLst/>
@@ -278,11 +276,10 @@
             <a:pPr indent="0" algn="ctr">
               <a:buNone/>
             </a:pPr>
-            <a:endParaRPr b="0" lang="en-US" sz="3200" strike="noStrike" u="none">
-              <a:solidFill>
-                <a:srgbClr val="000000"/>
-              </a:solidFill>
-              <a:uFillTx/>
+            <a:endParaRPr b="0" lang="en-US" sz="3200" spc="-1" strike="noStrike">
+              <a:solidFill>
+                <a:srgbClr val="000000"/>
+              </a:solidFill>
               <a:latin typeface="Arial"/>
             </a:endParaRPr>
           </a:p>
@@ -295,7 +292,7 @@
             <a:spLocks noGrp="1"/>
           </p:cNvSpPr>
           <p:nvPr>
-            <p:ph type="ftr" idx="2"/>
+            <p:ph type="ftr" idx="4"/>
           </p:nvPr>
         </p:nvSpPr>
         <p:spPr/>
@@ -315,14 +312,14 @@
             <a:spLocks noGrp="1"/>
           </p:cNvSpPr>
           <p:nvPr>
-            <p:ph type="sldNum" idx="3"/>
+            <p:ph type="sldNum" idx="5"/>
           </p:nvPr>
         </p:nvSpPr>
         <p:spPr/>
         <p:txBody>
           <a:bodyPr/>
           <a:p>
-            <a:fld id="{760BFE62-EF2D-42E4-9D47-4054820A5DF0}" type="slidenum">
+            <a:fld id="{0F1C9AB4-3D86-4D59-9989-75A96AA8E05F}" type="slidenum">
               <a:t>&lt;#&gt;</a:t>
             </a:fld>
           </a:p>
@@ -335,7 +332,7 @@
             <a:spLocks noGrp="1"/>
           </p:cNvSpPr>
           <p:nvPr>
-            <p:ph type="dt" idx="1"/>
+            <p:ph type="dt" idx="6"/>
           </p:nvPr>
         </p:nvSpPr>
         <p:spPr/>
@@ -384,7 +381,7 @@
         <p:spPr>
           <a:xfrm>
             <a:off x="504000" y="226080"/>
-            <a:ext cx="9071640" cy="946440"/>
+            <a:ext cx="9070560" cy="945360"/>
           </a:xfrm>
           <a:prstGeom prst="rect">
             <a:avLst/>
@@ -399,24 +396,22 @@
             <a:noAutofit/>
           </a:bodyPr>
           <a:p>
-            <a:pPr indent="0" algn="ctr">
+            <a:pPr indent="0">
               <a:buNone/>
             </a:pPr>
             <a:r>
-              <a:rPr b="0" lang="en-US" sz="4400" strike="noStrike" u="none">
-                <a:solidFill>
-                  <a:srgbClr val="000000"/>
-                </a:solidFill>
-                <a:uFillTx/>
+              <a:rPr b="0" lang="en-US" sz="1800" spc="-1" strike="noStrike">
+                <a:solidFill>
+                  <a:srgbClr val="000000"/>
+                </a:solidFill>
                 <a:latin typeface="Arial"/>
               </a:rPr>
               <a:t>Click to edit the title text format</a:t>
             </a:r>
-            <a:endParaRPr b="0" lang="en-US" sz="4400" strike="noStrike" u="none">
-              <a:solidFill>
-                <a:srgbClr val="000000"/>
-              </a:solidFill>
-              <a:uFillTx/>
+            <a:endParaRPr b="0" lang="en-US" sz="1800" spc="-1" strike="noStrike">
+              <a:solidFill>
+                <a:srgbClr val="000000"/>
+              </a:solidFill>
               <a:latin typeface="Arial"/>
             </a:endParaRPr>
           </a:p>
@@ -435,7 +430,7 @@
         <p:spPr>
           <a:xfrm>
             <a:off x="504000" y="1326600"/>
-            <a:ext cx="9071640" cy="3288240"/>
+            <a:ext cx="9070560" cy="3287160"/>
           </a:xfrm>
           <a:prstGeom prst="rect">
             <a:avLst/>
@@ -462,20 +457,18 @@
               <a:buChar char=""/>
             </a:pPr>
             <a:r>
-              <a:rPr b="0" lang="en-US" sz="3200" strike="noStrike" u="none">
-                <a:solidFill>
-                  <a:srgbClr val="000000"/>
-                </a:solidFill>
-                <a:uFillTx/>
+              <a:rPr b="0" lang="en-US" sz="1800" spc="-1" strike="noStrike">
+                <a:solidFill>
+                  <a:srgbClr val="000000"/>
+                </a:solidFill>
                 <a:latin typeface="Arial"/>
               </a:rPr>
               <a:t>Click to edit the outline text format</a:t>
             </a:r>
-            <a:endParaRPr b="0" lang="en-US" sz="3200" strike="noStrike" u="none">
-              <a:solidFill>
-                <a:srgbClr val="000000"/>
-              </a:solidFill>
-              <a:uFillTx/>
+            <a:endParaRPr b="0" lang="en-US" sz="1800" spc="-1" strike="noStrike">
+              <a:solidFill>
+                <a:srgbClr val="000000"/>
+              </a:solidFill>
               <a:latin typeface="Arial"/>
             </a:endParaRPr>
           </a:p>
@@ -492,20 +485,18 @@
               <a:buChar char=""/>
             </a:pPr>
             <a:r>
-              <a:rPr b="0" lang="en-US" sz="2800" strike="noStrike" u="none">
-                <a:solidFill>
-                  <a:srgbClr val="000000"/>
-                </a:solidFill>
-                <a:uFillTx/>
+              <a:rPr b="0" lang="en-US" sz="1800" spc="-1" strike="noStrike">
+                <a:solidFill>
+                  <a:srgbClr val="000000"/>
+                </a:solidFill>
                 <a:latin typeface="Arial"/>
               </a:rPr>
               <a:t>Second Outline Level</a:t>
             </a:r>
-            <a:endParaRPr b="0" lang="en-US" sz="2800" strike="noStrike" u="none">
-              <a:solidFill>
-                <a:srgbClr val="000000"/>
-              </a:solidFill>
-              <a:uFillTx/>
+            <a:endParaRPr b="0" lang="en-US" sz="1800" spc="-1" strike="noStrike">
+              <a:solidFill>
+                <a:srgbClr val="000000"/>
+              </a:solidFill>
               <a:latin typeface="Arial"/>
             </a:endParaRPr>
           </a:p>
@@ -522,20 +513,18 @@
               <a:buChar char=""/>
             </a:pPr>
             <a:r>
-              <a:rPr b="0" lang="en-US" sz="2400" strike="noStrike" u="none">
-                <a:solidFill>
-                  <a:srgbClr val="000000"/>
-                </a:solidFill>
-                <a:uFillTx/>
+              <a:rPr b="0" lang="en-US" sz="1800" spc="-1" strike="noStrike">
+                <a:solidFill>
+                  <a:srgbClr val="000000"/>
+                </a:solidFill>
                 <a:latin typeface="Arial"/>
               </a:rPr>
               <a:t>Third Outline Level</a:t>
             </a:r>
-            <a:endParaRPr b="0" lang="en-US" sz="2400" strike="noStrike" u="none">
-              <a:solidFill>
-                <a:srgbClr val="000000"/>
-              </a:solidFill>
-              <a:uFillTx/>
+            <a:endParaRPr b="0" lang="en-US" sz="1800" spc="-1" strike="noStrike">
+              <a:solidFill>
+                <a:srgbClr val="000000"/>
+              </a:solidFill>
               <a:latin typeface="Arial"/>
             </a:endParaRPr>
           </a:p>
@@ -552,20 +541,18 @@
               <a:buChar char=""/>
             </a:pPr>
             <a:r>
-              <a:rPr b="0" lang="en-US" sz="2000" strike="noStrike" u="none">
-                <a:solidFill>
-                  <a:srgbClr val="000000"/>
-                </a:solidFill>
-                <a:uFillTx/>
+              <a:rPr b="0" lang="en-US" sz="1800" spc="-1" strike="noStrike">
+                <a:solidFill>
+                  <a:srgbClr val="000000"/>
+                </a:solidFill>
                 <a:latin typeface="Arial"/>
               </a:rPr>
               <a:t>Fourth Outline Level</a:t>
             </a:r>
-            <a:endParaRPr b="0" lang="en-US" sz="2000" strike="noStrike" u="none">
-              <a:solidFill>
-                <a:srgbClr val="000000"/>
-              </a:solidFill>
-              <a:uFillTx/>
+            <a:endParaRPr b="0" lang="en-US" sz="1800" spc="-1" strike="noStrike">
+              <a:solidFill>
+                <a:srgbClr val="000000"/>
+              </a:solidFill>
               <a:latin typeface="Arial"/>
             </a:endParaRPr>
           </a:p>
@@ -582,20 +569,18 @@
               <a:buChar char=""/>
             </a:pPr>
             <a:r>
-              <a:rPr b="0" lang="en-US" sz="2000" strike="noStrike" u="none">
-                <a:solidFill>
-                  <a:srgbClr val="000000"/>
-                </a:solidFill>
-                <a:uFillTx/>
+              <a:rPr b="0" lang="en-US" sz="1800" spc="-1" strike="noStrike">
+                <a:solidFill>
+                  <a:srgbClr val="000000"/>
+                </a:solidFill>
                 <a:latin typeface="Arial"/>
               </a:rPr>
               <a:t>Fifth Outline Level</a:t>
             </a:r>
-            <a:endParaRPr b="0" lang="en-US" sz="2000" strike="noStrike" u="none">
-              <a:solidFill>
-                <a:srgbClr val="000000"/>
-              </a:solidFill>
-              <a:uFillTx/>
+            <a:endParaRPr b="0" lang="en-US" sz="1800" spc="-1" strike="noStrike">
+              <a:solidFill>
+                <a:srgbClr val="000000"/>
+              </a:solidFill>
               <a:latin typeface="Arial"/>
             </a:endParaRPr>
           </a:p>
@@ -612,20 +597,18 @@
               <a:buChar char=""/>
             </a:pPr>
             <a:r>
-              <a:rPr b="0" lang="en-US" sz="2000" strike="noStrike" u="none">
-                <a:solidFill>
-                  <a:srgbClr val="000000"/>
-                </a:solidFill>
-                <a:uFillTx/>
+              <a:rPr b="0" lang="en-US" sz="1800" spc="-1" strike="noStrike">
+                <a:solidFill>
+                  <a:srgbClr val="000000"/>
+                </a:solidFill>
                 <a:latin typeface="Arial"/>
               </a:rPr>
               <a:t>Sixth Outline Level</a:t>
             </a:r>
-            <a:endParaRPr b="0" lang="en-US" sz="2000" strike="noStrike" u="none">
-              <a:solidFill>
-                <a:srgbClr val="000000"/>
-              </a:solidFill>
-              <a:uFillTx/>
+            <a:endParaRPr b="0" lang="en-US" sz="1800" spc="-1" strike="noStrike">
+              <a:solidFill>
+                <a:srgbClr val="000000"/>
+              </a:solidFill>
               <a:latin typeface="Arial"/>
             </a:endParaRPr>
           </a:p>
@@ -642,20 +625,18 @@
               <a:buChar char=""/>
             </a:pPr>
             <a:r>
-              <a:rPr b="0" lang="en-US" sz="2000" strike="noStrike" u="none">
-                <a:solidFill>
-                  <a:srgbClr val="000000"/>
-                </a:solidFill>
-                <a:uFillTx/>
+              <a:rPr b="0" lang="en-US" sz="1800" spc="-1" strike="noStrike">
+                <a:solidFill>
+                  <a:srgbClr val="000000"/>
+                </a:solidFill>
                 <a:latin typeface="Arial"/>
               </a:rPr>
               <a:t>Seventh Outline Level</a:t>
             </a:r>
-            <a:endParaRPr b="0" lang="en-US" sz="2000" strike="noStrike" u="none">
-              <a:solidFill>
-                <a:srgbClr val="000000"/>
-              </a:solidFill>
-              <a:uFillTx/>
+            <a:endParaRPr b="0" lang="en-US" sz="1800" spc="-1" strike="noStrike">
+              <a:solidFill>
+                <a:srgbClr val="000000"/>
+              </a:solidFill>
               <a:latin typeface="Arial"/>
             </a:endParaRPr>
           </a:p>
@@ -668,13 +649,157 @@
             <a:spLocks noGrp="1"/>
           </p:cNvSpPr>
           <p:nvPr>
-            <p:ph type="dt" idx="1"/>
+            <p:ph type="ftr" idx="1"/>
+          </p:nvPr>
+        </p:nvSpPr>
+        <p:spPr>
+          <a:xfrm>
+            <a:off x="3447360" y="5165280"/>
+            <a:ext cx="3193920" cy="389520"/>
+          </a:xfrm>
+          <a:prstGeom prst="rect">
+            <a:avLst/>
+          </a:prstGeom>
+          <a:noFill/>
+          <a:ln w="0">
+            <a:noFill/>
+          </a:ln>
+        </p:spPr>
+        <p:txBody>
+          <a:bodyPr lIns="0" rIns="0" tIns="0" bIns="0" anchor="t">
+            <a:noAutofit/>
+          </a:bodyPr>
+          <a:lstStyle>
+            <a:lvl1pPr indent="0" algn="ctr">
+              <a:lnSpc>
+                <a:spcPct val="100000"/>
+              </a:lnSpc>
+              <a:buNone/>
+              <a:tabLst>
+                <a:tab algn="l" pos="0"/>
+              </a:tabLst>
+              <a:defRPr b="0" lang="en-US" sz="1400" spc="-1" strike="noStrike">
+                <a:solidFill>
+                  <a:srgbClr val="000000"/>
+                </a:solidFill>
+                <a:latin typeface="Times New Roman"/>
+              </a:defRPr>
+            </a:lvl1pPr>
+          </a:lstStyle>
+          <a:p>
+            <a:pPr indent="0" algn="ctr">
+              <a:lnSpc>
+                <a:spcPct val="100000"/>
+              </a:lnSpc>
+              <a:buNone/>
+              <a:tabLst>
+                <a:tab algn="l" pos="0"/>
+              </a:tabLst>
+            </a:pPr>
+            <a:r>
+              <a:rPr b="0" lang="en-US" sz="1400" spc="-1" strike="noStrike">
+                <a:solidFill>
+                  <a:srgbClr val="000000"/>
+                </a:solidFill>
+                <a:latin typeface="Times New Roman"/>
+              </a:rPr>
+              <a:t>&lt;footer&gt;</a:t>
+            </a:r>
+            <a:endParaRPr b="0" lang="en-US" sz="1400" spc="-1" strike="noStrike">
+              <a:solidFill>
+                <a:srgbClr val="000000"/>
+              </a:solidFill>
+              <a:latin typeface="Times New Roman"/>
+            </a:endParaRPr>
+          </a:p>
+        </p:txBody>
+      </p:sp>
+      <p:sp>
+        <p:nvSpPr>
+          <p:cNvPr id="3" name="PlaceHolder 4"/>
+          <p:cNvSpPr>
+            <a:spLocks noGrp="1"/>
+          </p:cNvSpPr>
+          <p:nvPr>
+            <p:ph type="sldNum" idx="2"/>
+          </p:nvPr>
+        </p:nvSpPr>
+        <p:spPr>
+          <a:xfrm>
+            <a:off x="7227360" y="5165280"/>
+            <a:ext cx="2347200" cy="389520"/>
+          </a:xfrm>
+          <a:prstGeom prst="rect">
+            <a:avLst/>
+          </a:prstGeom>
+          <a:noFill/>
+          <a:ln w="0">
+            <a:noFill/>
+          </a:ln>
+        </p:spPr>
+        <p:txBody>
+          <a:bodyPr lIns="0" rIns="0" tIns="0" bIns="0" anchor="t">
+            <a:noAutofit/>
+          </a:bodyPr>
+          <a:lstStyle>
+            <a:lvl1pPr indent="0" algn="r">
+              <a:lnSpc>
+                <a:spcPct val="100000"/>
+              </a:lnSpc>
+              <a:buNone/>
+              <a:tabLst>
+                <a:tab algn="l" pos="0"/>
+              </a:tabLst>
+              <a:defRPr b="0" lang="en-US" sz="1400" spc="-1" strike="noStrike">
+                <a:solidFill>
+                  <a:srgbClr val="000000"/>
+                </a:solidFill>
+                <a:latin typeface="Times New Roman"/>
+              </a:defRPr>
+            </a:lvl1pPr>
+          </a:lstStyle>
+          <a:p>
+            <a:pPr indent="0" algn="r">
+              <a:lnSpc>
+                <a:spcPct val="100000"/>
+              </a:lnSpc>
+              <a:buNone/>
+              <a:tabLst>
+                <a:tab algn="l" pos="0"/>
+              </a:tabLst>
+            </a:pPr>
+            <a:fld id="{AC0ED011-30B6-489A-B730-5E0854E2BAFB}" type="slidenum">
+              <a:rPr b="0" lang="en-US" sz="1400" spc="-1" strike="noStrike">
+                <a:solidFill>
+                  <a:srgbClr val="000000"/>
+                </a:solidFill>
+                <a:latin typeface="Times New Roman"/>
+              </a:rPr>
+              <a:t>&lt;number&gt;</a:t>
+            </a:fld>
+            <a:endParaRPr b="0" lang="en-US" sz="1400" spc="-1" strike="noStrike">
+              <a:solidFill>
+                <a:srgbClr val="000000"/>
+              </a:solidFill>
+              <a:latin typeface="Times New Roman"/>
+            </a:endParaRPr>
+          </a:p>
+        </p:txBody>
+      </p:sp>
+      <p:sp>
+        <p:nvSpPr>
+          <p:cNvPr id="4" name="PlaceHolder 5"/>
+          <p:cNvSpPr>
+            <a:spLocks noGrp="1"/>
+          </p:cNvSpPr>
+          <p:nvPr>
+            <p:ph type="dt" idx="3"/>
           </p:nvPr>
         </p:nvSpPr>
         <p:spPr>
           <a:xfrm>
             <a:off x="504000" y="5165280"/>
-            <a:ext cx="2348280" cy="390600"/>
+            <a:ext cx="2347200" cy="389520"/>
           </a:xfrm>
           <a:prstGeom prst="rect">
             <a:avLst/>
@@ -691,11 +816,10 @@
           <a:lstStyle>
             <a:lvl1pPr indent="0">
               <a:buNone/>
-              <a:defRPr b="0" lang="en-US" sz="1400" strike="noStrike" u="none">
-                <a:solidFill>
-                  <a:srgbClr val="000000"/>
-                </a:solidFill>
-                <a:uFillTx/>
+              <a:defRPr b="0" lang="en-US" sz="1400" spc="-1" strike="noStrike">
+                <a:solidFill>
+                  <a:srgbClr val="000000"/>
+                </a:solidFill>
                 <a:latin typeface="Times New Roman"/>
               </a:defRPr>
             </a:lvl1pPr>
@@ -705,39 +829,112 @@
               <a:buNone/>
             </a:pPr>
             <a:r>
-              <a:rPr b="0" lang="en-US" sz="1400" strike="noStrike" u="none">
-                <a:solidFill>
-                  <a:srgbClr val="000000"/>
-                </a:solidFill>
-                <a:uFillTx/>
+              <a:rPr b="0" lang="en-US" sz="1400" spc="-1" strike="noStrike">
+                <a:solidFill>
+                  <a:srgbClr val="000000"/>
+                </a:solidFill>
                 <a:latin typeface="Times New Roman"/>
               </a:rPr>
               <a:t>&lt;date/time&gt;</a:t>
             </a:r>
-            <a:endParaRPr b="0" lang="en-US" sz="1400" strike="noStrike" u="none">
-              <a:solidFill>
-                <a:srgbClr val="000000"/>
-              </a:solidFill>
-              <a:uFillTx/>
+            <a:endParaRPr b="0" lang="en-US" sz="1400" spc="-1" strike="noStrike">
+              <a:solidFill>
+                <a:srgbClr val="000000"/>
+              </a:solidFill>
               <a:latin typeface="Times New Roman"/>
+            </a:endParaRPr>
+          </a:p>
+        </p:txBody>
+      </p:sp>
+    </p:spTree>
+  </p:cSld>
+  <p:clrMap bg1="lt1" bg2="lt2" tx1="dk1" tx2="dk2" accent1="accent1" accent2="accent2" accent3="accent3" accent4="accent4" accent5="accent5" accent6="accent6" hlink="hlink" folHlink="folHlink"/>
+  <p:sldLayoutIdLst>
+    <p:sldLayoutId id="2147483649" r:id="rId2"/>
+  </p:sldLayoutIdLst>
+</p:sldMaster>
+</file>
+
+<file path=ppt/slideMasters/slideMaster2.xml><?xml version="1.0" encoding="utf-8"?>
+<p:sldMaster xmlns:a="http://schemas.openxmlformats.org/drawingml/2006/main" xmlns:p="http://schemas.openxmlformats.org/presentationml/2006/main" xmlns:r="http://schemas.openxmlformats.org/officeDocument/2006/relationships" xmlns:p14="http://schemas.microsoft.com/office/powerpoint/2010/main" xmlns:p15="http://schemas.microsoft.com/office/powerpoint/2012/main" xmlns:mc="http://schemas.openxmlformats.org/markup-compatibility/2006">
+  <p:cSld>
+    <p:spTree>
+      <p:nvGrpSpPr>
+        <p:cNvPr id="1" name=""/>
+        <p:cNvGrpSpPr/>
+        <p:nvPr/>
+      </p:nvGrpSpPr>
+      <p:grpSpPr>
+        <a:xfrm>
+          <a:off x="0" y="0"/>
+          <a:ext cx="0" cy="0"/>
+          <a:chOff x="0" y="0"/>
+          <a:chExt cx="0" cy="0"/>
+        </a:xfrm>
+      </p:grpSpPr>
+      <p:sp>
+        <p:nvSpPr>
+          <p:cNvPr id="7" name="PlaceHolder 1"/>
+          <p:cNvSpPr>
+            <a:spLocks noGrp="1"/>
+          </p:cNvSpPr>
+          <p:nvPr>
+            <p:ph type="title"/>
+          </p:nvPr>
+        </p:nvSpPr>
+        <p:spPr>
+          <a:xfrm>
+            <a:off x="504000" y="226080"/>
+            <a:ext cx="9070560" cy="945360"/>
+          </a:xfrm>
+          <a:prstGeom prst="rect">
+            <a:avLst/>
+          </a:prstGeom>
+          <a:noFill/>
+          <a:ln w="0">
+            <a:noFill/>
+          </a:ln>
+        </p:spPr>
+        <p:txBody>
+          <a:bodyPr lIns="0" rIns="0" tIns="0" bIns="0" anchor="ctr">
+            <a:noAutofit/>
+          </a:bodyPr>
+          <a:p>
+            <a:pPr indent="0">
+              <a:buNone/>
+            </a:pPr>
+            <a:r>
+              <a:rPr b="0" lang="en-US" sz="1800" spc="-1" strike="noStrike">
+                <a:solidFill>
+                  <a:srgbClr val="000000"/>
+                </a:solidFill>
+                <a:latin typeface="Arial"/>
+              </a:rPr>
+              <a:t>Click to edit the title text format</a:t>
+            </a:r>
+            <a:endParaRPr b="0" lang="en-US" sz="1800" spc="-1" strike="noStrike">
+              <a:solidFill>
+                <a:srgbClr val="000000"/>
+              </a:solidFill>
+              <a:latin typeface="Arial"/>
             </a:endParaRPr>
           </a:p>
         </p:txBody>
       </p:sp>
       <p:sp>
         <p:nvSpPr>
-          <p:cNvPr id="3" name="PlaceHolder 4"/>
+          <p:cNvPr id="8" name="PlaceHolder 2"/>
           <p:cNvSpPr>
             <a:spLocks noGrp="1"/>
           </p:cNvSpPr>
           <p:nvPr>
-            <p:ph type="ftr" idx="2"/>
+            <p:ph type="ftr" idx="4"/>
           </p:nvPr>
         </p:nvSpPr>
         <p:spPr>
           <a:xfrm>
             <a:off x="3447360" y="5165280"/>
-            <a:ext cx="3195000" cy="390600"/>
+            <a:ext cx="3193920" cy="389520"/>
           </a:xfrm>
           <a:prstGeom prst="rect">
             <a:avLst/>
@@ -753,35 +950,44 @@
           </a:bodyPr>
           <a:lstStyle>
             <a:lvl1pPr indent="0" algn="ctr">
+              <a:lnSpc>
+                <a:spcPct val="100000"/>
+              </a:lnSpc>
               <a:buNone/>
-              <a:defRPr b="0" lang="en-US" sz="1400" strike="noStrike" u="none">
-                <a:solidFill>
-                  <a:srgbClr val="000000"/>
-                </a:solidFill>
-                <a:uFillTx/>
+              <a:tabLst>
+                <a:tab algn="l" pos="0"/>
+              </a:tabLst>
+              <a:defRPr b="0" lang="en-US" sz="1400" spc="-1" strike="noStrike">
+                <a:solidFill>
+                  <a:srgbClr val="000000"/>
+                </a:solidFill>
                 <a:latin typeface="Times New Roman"/>
               </a:defRPr>
             </a:lvl1pPr>
           </a:lstStyle>
           <a:p>
             <a:pPr indent="0" algn="ctr">
+              <a:lnSpc>
+                <a:spcPct val="100000"/>
+              </a:lnSpc>
               <a:buNone/>
-            </a:pPr>
-            <a:r>
-              <a:rPr b="0" lang="en-US" sz="1400" strike="noStrike" u="none">
-                <a:solidFill>
-                  <a:srgbClr val="000000"/>
-                </a:solidFill>
-                <a:uFillTx/>
+              <a:tabLst>
+                <a:tab algn="l" pos="0"/>
+              </a:tabLst>
+            </a:pPr>
+            <a:r>
+              <a:rPr b="0" lang="en-US" sz="1400" spc="-1" strike="noStrike">
+                <a:solidFill>
+                  <a:srgbClr val="000000"/>
+                </a:solidFill>
                 <a:latin typeface="Times New Roman"/>
               </a:rPr>
               <a:t>&lt;footer&gt;</a:t>
             </a:r>
-            <a:endParaRPr b="0" lang="en-US" sz="1400" strike="noStrike" u="none">
-              <a:solidFill>
-                <a:srgbClr val="000000"/>
-              </a:solidFill>
-              <a:uFillTx/>
+            <a:endParaRPr b="0" lang="en-US" sz="1400" spc="-1" strike="noStrike">
+              <a:solidFill>
+                <a:srgbClr val="000000"/>
+              </a:solidFill>
               <a:latin typeface="Times New Roman"/>
             </a:endParaRPr>
           </a:p>
@@ -789,18 +995,18 @@
       </p:sp>
       <p:sp>
         <p:nvSpPr>
-          <p:cNvPr id="4" name="PlaceHolder 5"/>
+          <p:cNvPr id="9" name="PlaceHolder 3"/>
           <p:cNvSpPr>
             <a:spLocks noGrp="1"/>
           </p:cNvSpPr>
           <p:nvPr>
-            <p:ph type="sldNum" idx="3"/>
+            <p:ph type="sldNum" idx="5"/>
           </p:nvPr>
         </p:nvSpPr>
         <p:spPr>
           <a:xfrm>
             <a:off x="7227360" y="5165280"/>
-            <a:ext cx="2348280" cy="390600"/>
+            <a:ext cx="2347200" cy="389520"/>
           </a:xfrm>
           <a:prstGeom prst="rect">
             <a:avLst/>
@@ -816,46 +1022,339 @@
           </a:bodyPr>
           <a:lstStyle>
             <a:lvl1pPr indent="0" algn="r">
+              <a:lnSpc>
+                <a:spcPct val="100000"/>
+              </a:lnSpc>
               <a:buNone/>
-              <a:defRPr b="0" lang="en-US" sz="1400" strike="noStrike" u="none">
-                <a:solidFill>
-                  <a:srgbClr val="000000"/>
-                </a:solidFill>
-                <a:uFillTx/>
+              <a:tabLst>
+                <a:tab algn="l" pos="0"/>
+              </a:tabLst>
+              <a:defRPr b="0" lang="en-US" sz="1400" spc="-1" strike="noStrike">
+                <a:solidFill>
+                  <a:srgbClr val="000000"/>
+                </a:solidFill>
                 <a:latin typeface="Times New Roman"/>
               </a:defRPr>
             </a:lvl1pPr>
           </a:lstStyle>
           <a:p>
             <a:pPr indent="0" algn="r">
+              <a:lnSpc>
+                <a:spcPct val="100000"/>
+              </a:lnSpc>
               <a:buNone/>
-            </a:pPr>
-            <a:fld id="{5C08A30E-25CD-4B2A-984A-ECA61ED65827}" type="slidenum">
-              <a:rPr b="0" lang="en-US" sz="1400" strike="noStrike" u="none">
-                <a:solidFill>
-                  <a:srgbClr val="000000"/>
-                </a:solidFill>
-                <a:uFillTx/>
+              <a:tabLst>
+                <a:tab algn="l" pos="0"/>
+              </a:tabLst>
+            </a:pPr>
+            <a:fld id="{AC8F6A46-9C5A-4BF2-9F0F-4DD2F12720C9}" type="slidenum">
+              <a:rPr b="0" lang="en-US" sz="1400" spc="-1" strike="noStrike">
+                <a:solidFill>
+                  <a:srgbClr val="000000"/>
+                </a:solidFill>
                 <a:latin typeface="Times New Roman"/>
               </a:rPr>
               <a:t>&lt;number&gt;</a:t>
             </a:fld>
-            <a:endParaRPr b="0" lang="en-US" sz="1400" strike="noStrike" u="none">
-              <a:solidFill>
-                <a:srgbClr val="000000"/>
-              </a:solidFill>
-              <a:uFillTx/>
+            <a:endParaRPr b="0" lang="en-US" sz="1400" spc="-1" strike="noStrike">
+              <a:solidFill>
+                <a:srgbClr val="000000"/>
+              </a:solidFill>
               <a:latin typeface="Times New Roman"/>
+            </a:endParaRPr>
+          </a:p>
+        </p:txBody>
+      </p:sp>
+      <p:sp>
+        <p:nvSpPr>
+          <p:cNvPr id="10" name="PlaceHolder 4"/>
+          <p:cNvSpPr>
+            <a:spLocks noGrp="1"/>
+          </p:cNvSpPr>
+          <p:nvPr>
+            <p:ph type="dt" idx="6"/>
+          </p:nvPr>
+        </p:nvSpPr>
+        <p:spPr>
+          <a:xfrm>
+            <a:off x="504000" y="5165280"/>
+            <a:ext cx="2347200" cy="389520"/>
+          </a:xfrm>
+          <a:prstGeom prst="rect">
+            <a:avLst/>
+          </a:prstGeom>
+          <a:noFill/>
+          <a:ln w="0">
+            <a:noFill/>
+          </a:ln>
+        </p:spPr>
+        <p:txBody>
+          <a:bodyPr lIns="0" rIns="0" tIns="0" bIns="0" anchor="t">
+            <a:noAutofit/>
+          </a:bodyPr>
+          <a:lstStyle>
+            <a:lvl1pPr indent="0">
+              <a:buNone/>
+              <a:defRPr b="0" lang="en-US" sz="1400" spc="-1" strike="noStrike">
+                <a:solidFill>
+                  <a:srgbClr val="000000"/>
+                </a:solidFill>
+                <a:latin typeface="Times New Roman"/>
+              </a:defRPr>
+            </a:lvl1pPr>
+          </a:lstStyle>
+          <a:p>
+            <a:pPr indent="0">
+              <a:buNone/>
+            </a:pPr>
+            <a:r>
+              <a:rPr b="0" lang="en-US" sz="1400" spc="-1" strike="noStrike">
+                <a:solidFill>
+                  <a:srgbClr val="000000"/>
+                </a:solidFill>
+                <a:latin typeface="Times New Roman"/>
+              </a:rPr>
+              <a:t>&lt;date/time&gt;</a:t>
+            </a:r>
+            <a:endParaRPr b="0" lang="en-US" sz="1400" spc="-1" strike="noStrike">
+              <a:solidFill>
+                <a:srgbClr val="000000"/>
+              </a:solidFill>
+              <a:latin typeface="Times New Roman"/>
+            </a:endParaRPr>
+          </a:p>
+        </p:txBody>
+      </p:sp>
+      <p:sp>
+        <p:nvSpPr>
+          <p:cNvPr id="11" name="PlaceHolder 5"/>
+          <p:cNvSpPr>
+            <a:spLocks noGrp="1"/>
+          </p:cNvSpPr>
+          <p:nvPr>
+            <p:ph type="body"/>
+          </p:nvPr>
+        </p:nvSpPr>
+        <p:spPr>
+          <a:xfrm>
+            <a:off x="504000" y="1326600"/>
+            <a:ext cx="9072000" cy="3288600"/>
+          </a:xfrm>
+          <a:prstGeom prst="rect">
+            <a:avLst/>
+          </a:prstGeom>
+          <a:noFill/>
+          <a:ln w="0">
+            <a:noFill/>
+          </a:ln>
+        </p:spPr>
+        <p:txBody>
+          <a:bodyPr lIns="0" rIns="0" tIns="0" bIns="0" anchor="t">
+            <a:normAutofit/>
+          </a:bodyPr>
+          <a:p>
+            <a:pPr marL="432000" indent="-324000">
+              <a:spcBef>
+                <a:spcPts val="1417"/>
+              </a:spcBef>
+              <a:buClr>
+                <a:srgbClr val="000000"/>
+              </a:buClr>
+              <a:buSzPct val="45000"/>
+              <a:buFont typeface="Wingdings" charset="2"/>
+              <a:buChar char=""/>
+            </a:pPr>
+            <a:r>
+              <a:rPr b="0" lang="en-US" sz="3200" spc="-1" strike="noStrike">
+                <a:solidFill>
+                  <a:srgbClr val="000000"/>
+                </a:solidFill>
+                <a:latin typeface="Arial"/>
+              </a:rPr>
+              <a:t>Click to edit the outline text format</a:t>
+            </a:r>
+            <a:endParaRPr b="0" lang="en-US" sz="3200" spc="-1" strike="noStrike">
+              <a:solidFill>
+                <a:srgbClr val="000000"/>
+              </a:solidFill>
+              <a:latin typeface="Arial"/>
+            </a:endParaRPr>
+          </a:p>
+          <a:p>
+            <a:pPr lvl="1" marL="864000" indent="-324000">
+              <a:spcBef>
+                <a:spcPts val="1134"/>
+              </a:spcBef>
+              <a:buClr>
+                <a:srgbClr val="000000"/>
+              </a:buClr>
+              <a:buSzPct val="75000"/>
+              <a:buFont typeface="Symbol" charset="2"/>
+              <a:buChar char=""/>
+            </a:pPr>
+            <a:r>
+              <a:rPr b="0" lang="en-US" sz="2800" spc="-1" strike="noStrike">
+                <a:solidFill>
+                  <a:srgbClr val="000000"/>
+                </a:solidFill>
+                <a:latin typeface="Arial"/>
+              </a:rPr>
+              <a:t>Second Outline Level</a:t>
+            </a:r>
+            <a:endParaRPr b="0" lang="en-US" sz="2800" spc="-1" strike="noStrike">
+              <a:solidFill>
+                <a:srgbClr val="000000"/>
+              </a:solidFill>
+              <a:latin typeface="Arial"/>
+            </a:endParaRPr>
+          </a:p>
+          <a:p>
+            <a:pPr lvl="2" marL="1296000" indent="-288000">
+              <a:spcBef>
+                <a:spcPts val="850"/>
+              </a:spcBef>
+              <a:buClr>
+                <a:srgbClr val="000000"/>
+              </a:buClr>
+              <a:buSzPct val="45000"/>
+              <a:buFont typeface="Wingdings" charset="2"/>
+              <a:buChar char=""/>
+            </a:pPr>
+            <a:r>
+              <a:rPr b="0" lang="en-US" sz="2400" spc="-1" strike="noStrike">
+                <a:solidFill>
+                  <a:srgbClr val="000000"/>
+                </a:solidFill>
+                <a:latin typeface="Arial"/>
+              </a:rPr>
+              <a:t>Third Outline Level</a:t>
+            </a:r>
+            <a:endParaRPr b="0" lang="en-US" sz="2400" spc="-1" strike="noStrike">
+              <a:solidFill>
+                <a:srgbClr val="000000"/>
+              </a:solidFill>
+              <a:latin typeface="Arial"/>
+            </a:endParaRPr>
+          </a:p>
+          <a:p>
+            <a:pPr lvl="3" marL="1728000" indent="-216000">
+              <a:spcBef>
+                <a:spcPts val="567"/>
+              </a:spcBef>
+              <a:buClr>
+                <a:srgbClr val="000000"/>
+              </a:buClr>
+              <a:buSzPct val="75000"/>
+              <a:buFont typeface="Symbol" charset="2"/>
+              <a:buChar char=""/>
+            </a:pPr>
+            <a:r>
+              <a:rPr b="0" lang="en-US" sz="2000" spc="-1" strike="noStrike">
+                <a:solidFill>
+                  <a:srgbClr val="000000"/>
+                </a:solidFill>
+                <a:latin typeface="Arial"/>
+              </a:rPr>
+              <a:t>Fourth Outline Level</a:t>
+            </a:r>
+            <a:endParaRPr b="0" lang="en-US" sz="2000" spc="-1" strike="noStrike">
+              <a:solidFill>
+                <a:srgbClr val="000000"/>
+              </a:solidFill>
+              <a:latin typeface="Arial"/>
+            </a:endParaRPr>
+          </a:p>
+          <a:p>
+            <a:pPr lvl="4" marL="2160000" indent="-216000">
+              <a:spcBef>
+                <a:spcPts val="283"/>
+              </a:spcBef>
+              <a:buClr>
+                <a:srgbClr val="000000"/>
+              </a:buClr>
+              <a:buSzPct val="45000"/>
+              <a:buFont typeface="Wingdings" charset="2"/>
+              <a:buChar char=""/>
+            </a:pPr>
+            <a:r>
+              <a:rPr b="0" lang="en-US" sz="2000" spc="-1" strike="noStrike">
+                <a:solidFill>
+                  <a:srgbClr val="000000"/>
+                </a:solidFill>
+                <a:latin typeface="Arial"/>
+              </a:rPr>
+              <a:t>Fifth Outline Level</a:t>
+            </a:r>
+            <a:endParaRPr b="0" lang="en-US" sz="2000" spc="-1" strike="noStrike">
+              <a:solidFill>
+                <a:srgbClr val="000000"/>
+              </a:solidFill>
+              <a:latin typeface="Arial"/>
+            </a:endParaRPr>
+          </a:p>
+          <a:p>
+            <a:pPr lvl="5" marL="2592000" indent="-216000">
+              <a:spcBef>
+                <a:spcPts val="283"/>
+              </a:spcBef>
+              <a:buClr>
+                <a:srgbClr val="000000"/>
+              </a:buClr>
+              <a:buSzPct val="45000"/>
+              <a:buFont typeface="Wingdings" charset="2"/>
+              <a:buChar char=""/>
+            </a:pPr>
+            <a:r>
+              <a:rPr b="0" lang="en-US" sz="2000" spc="-1" strike="noStrike">
+                <a:solidFill>
+                  <a:srgbClr val="000000"/>
+                </a:solidFill>
+                <a:latin typeface="Arial"/>
+              </a:rPr>
+              <a:t>Sixth Outline Level</a:t>
+            </a:r>
+            <a:endParaRPr b="0" lang="en-US" sz="2000" spc="-1" strike="noStrike">
+              <a:solidFill>
+                <a:srgbClr val="000000"/>
+              </a:solidFill>
+              <a:latin typeface="Arial"/>
+            </a:endParaRPr>
+          </a:p>
+          <a:p>
+            <a:pPr lvl="6" marL="3024000" indent="-216000">
+              <a:spcBef>
+                <a:spcPts val="283"/>
+              </a:spcBef>
+              <a:buClr>
+                <a:srgbClr val="000000"/>
+              </a:buClr>
+              <a:buSzPct val="45000"/>
+              <a:buFont typeface="Wingdings" charset="2"/>
+              <a:buChar char=""/>
+            </a:pPr>
+            <a:r>
+              <a:rPr b="0" lang="en-US" sz="2000" spc="-1" strike="noStrike">
+                <a:solidFill>
+                  <a:srgbClr val="000000"/>
+                </a:solidFill>
+                <a:latin typeface="Arial"/>
+              </a:rPr>
+              <a:t>Seventh Outline Level</a:t>
+            </a:r>
+            <a:endParaRPr b="0" lang="en-US" sz="2000" spc="-1" strike="noStrike">
+              <a:solidFill>
+                <a:srgbClr val="000000"/>
+              </a:solidFill>
+              <a:latin typeface="Arial"/>
             </a:endParaRPr>
           </a:p>
         </p:txBody>
       </p:sp>
     </p:spTree>
   </p:cSld>
-  <p:clrMap bg1="lt1" tx1="dk1" bg2="lt2" tx2="dk2" accent1="accent1" accent2="accent2" accent3="accent3" accent4="accent4" accent5="accent5" accent6="accent6" hlink="hlink" folHlink="folHlink"/>
+  <p:clrMap bg1="lt1" bg2="lt2" tx1="dk1" tx2="dk2" accent1="accent1" accent2="accent2" accent3="accent3" accent4="accent4" accent5="accent5" accent6="accent6" hlink="hlink" folHlink="folHlink"/>
   <p:sldLayoutIdLst>
-    <p:sldLayoutId id="2147483649" r:id="rId2"/>
-    <p:sldLayoutId id="2147483650" r:id="rId3"/>
+    <p:sldLayoutId id="2147483651" r:id="rId2"/>
   </p:sldLayoutIdLst>
 </p:sldMaster>
 </file>
@@ -879,7 +1378,7 @@
       </p:grpSpPr>
       <p:sp>
         <p:nvSpPr>
-          <p:cNvPr id="9" name="PlaceHolder 1"/>
+          <p:cNvPr id="14" name="PlaceHolder 1"/>
           <p:cNvSpPr>
             <a:spLocks noGrp="1"/>
           </p:cNvSpPr>
@@ -890,7 +1389,7 @@
         <p:spPr>
           <a:xfrm>
             <a:off x="504000" y="1110960"/>
-            <a:ext cx="9071640" cy="946440"/>
+            <a:ext cx="9070560" cy="945360"/>
           </a:xfrm>
           <a:prstGeom prst="rect">
             <a:avLst/>
@@ -906,23 +1405,39 @@
           </a:bodyPr>
           <a:p>
             <a:pPr indent="0" algn="ctr">
+              <a:lnSpc>
+                <a:spcPct val="100000"/>
+              </a:lnSpc>
               <a:buNone/>
-            </a:pPr>
-            <a:r>
-              <a:rPr b="0" lang="en-US" sz="4000" strike="noStrike" u="none">
-                <a:solidFill>
-                  <a:srgbClr val="000000"/>
-                </a:solidFill>
-                <a:uFillTx/>
-                <a:latin typeface="Arial"/>
-              </a:rPr>
-              <a:t>СОЗДАНИЕ API WEB-ПРИЛОЖЕНИЯ</a:t>
-            </a:r>
-            <a:endParaRPr b="0" lang="en-US" sz="4000" strike="noStrike" u="none">
-              <a:solidFill>
-                <a:srgbClr val="000000"/>
-              </a:solidFill>
-              <a:uFillTx/>
+              <a:tabLst>
+                <a:tab algn="l" pos="0"/>
+              </a:tabLst>
+            </a:pPr>
+            <a:r>
+              <a:rPr b="0" lang="en-US" sz="3200" spc="-1" strike="noStrike">
+                <a:solidFill>
+                  <a:srgbClr val="000000"/>
+                </a:solidFill>
+                <a:latin typeface="Arial"/>
+              </a:rPr>
+              <a:t>РАЗРАБОТКА API WEB-ПРИЛОЖЕНИЯ ДЛЯ ОРГАНИЗАЦИИ</a:t>
+            </a:r>
+            <a:br>
+              <a:rPr sz="3200"/>
+            </a:br>
+            <a:r>
+              <a:rPr b="0" lang="en-US" sz="3200" spc="-1" strike="noStrike">
+                <a:solidFill>
+                  <a:srgbClr val="000000"/>
+                </a:solidFill>
+                <a:latin typeface="Arial"/>
+              </a:rPr>
+              <a:t>ПРОЦЕССА УБОРКИ МУСОРА</a:t>
+            </a:r>
+            <a:endParaRPr b="0" lang="en-US" sz="3200" spc="-1" strike="noStrike">
+              <a:solidFill>
+                <a:srgbClr val="000000"/>
+              </a:solidFill>
               <a:latin typeface="Arial"/>
             </a:endParaRPr>
           </a:p>
@@ -930,7 +1445,7 @@
       </p:sp>
       <p:sp>
         <p:nvSpPr>
-          <p:cNvPr id="10" name="PlaceHolder 2"/>
+          <p:cNvPr id="15" name="PlaceHolder 2"/>
           <p:cNvSpPr>
             <a:spLocks noGrp="1"/>
           </p:cNvSpPr>
@@ -941,7 +1456,7 @@
         <p:spPr>
           <a:xfrm>
             <a:off x="504000" y="2743200"/>
-            <a:ext cx="9071640" cy="2279160"/>
+            <a:ext cx="9070560" cy="2278080"/>
           </a:xfrm>
           <a:prstGeom prst="rect">
             <a:avLst/>
@@ -957,39 +1472,48 @@
           </a:bodyPr>
           <a:p>
             <a:pPr indent="0" algn="ctr">
+              <a:lnSpc>
+                <a:spcPct val="100000"/>
+              </a:lnSpc>
               <a:buNone/>
-            </a:pPr>
-            <a:r>
-              <a:rPr b="0" lang="en-US" sz="3200" strike="noStrike" u="none">
-                <a:solidFill>
-                  <a:srgbClr val="000000"/>
-                </a:solidFill>
-                <a:uFillTx/>
+              <a:tabLst>
+                <a:tab algn="l" pos="0"/>
+              </a:tabLst>
+            </a:pPr>
+            <a:r>
+              <a:rPr b="0" lang="en-US" sz="3200" spc="-1" strike="noStrike">
+                <a:solidFill>
+                  <a:srgbClr val="000000"/>
+                </a:solidFill>
                 <a:latin typeface="Arial"/>
               </a:rPr>
               <a:t>Устюшин Богдан</a:t>
             </a:r>
-            <a:endParaRPr b="0" lang="en-US" sz="3200" strike="noStrike" u="none">
-              <a:solidFill>
-                <a:srgbClr val="000000"/>
-              </a:solidFill>
-              <a:uFillTx/>
+            <a:endParaRPr b="0" lang="en-US" sz="3200" spc="-1" strike="noStrike">
+              <a:solidFill>
+                <a:srgbClr val="000000"/>
+              </a:solidFill>
               <a:latin typeface="Arial"/>
             </a:endParaRPr>
           </a:p>
           <a:p>
             <a:pPr indent="0" algn="ctr">
+              <a:lnSpc>
+                <a:spcPct val="100000"/>
+              </a:lnSpc>
               <a:buNone/>
-            </a:pPr>
-            <a:r>
-              <a:rPr b="0" lang="en-US" sz="3200" strike="noStrike" u="none">
-                <a:solidFill>
-                  <a:srgbClr val="000000"/>
-                </a:solidFill>
-                <a:uFillTx/>
-                <a:latin typeface="Arial"/>
-              </a:rPr>
-              <a:t>451 группа</a:t>
+              <a:tabLst>
+                <a:tab algn="l" pos="0"/>
+              </a:tabLst>
+            </a:pPr>
+            <a:r>
+              <a:rPr b="0" lang="en-US" sz="3200" spc="-1" strike="noStrike">
+                <a:solidFill>
+                  <a:srgbClr val="000000"/>
+                </a:solidFill>
+                <a:latin typeface="Arial"/>
+              </a:rPr>
+              <a:t>351 группа</a:t>
             </a:r>
             <a:br>
               <a:rPr sz="3200"/>
@@ -997,33 +1521,36 @@
             <a:br>
               <a:rPr sz="3200"/>
             </a:br>
-            <a:endParaRPr b="0" lang="en-US" sz="3200" strike="noStrike" u="none">
-              <a:solidFill>
-                <a:srgbClr val="000000"/>
-              </a:solidFill>
-              <a:uFillTx/>
+            <a:endParaRPr b="0" lang="en-US" sz="3200" spc="-1" strike="noStrike">
+              <a:solidFill>
+                <a:srgbClr val="000000"/>
+              </a:solidFill>
               <a:latin typeface="Arial"/>
             </a:endParaRPr>
           </a:p>
           <a:p>
             <a:pPr indent="0" algn="ctr">
+              <a:lnSpc>
+                <a:spcPct val="100000"/>
+              </a:lnSpc>
               <a:buNone/>
-            </a:pPr>
-            <a:r>
-              <a:rPr b="0" lang="en-US" sz="3200" strike="noStrike" u="none">
-                <a:solidFill>
-                  <a:srgbClr val="000000"/>
-                </a:solidFill>
-                <a:uFillTx/>
+              <a:tabLst>
+                <a:tab algn="l" pos="0"/>
+              </a:tabLst>
+            </a:pPr>
+            <a:r>
+              <a:rPr b="0" lang="en-US" sz="3200" spc="-1" strike="noStrike">
+                <a:solidFill>
+                  <a:srgbClr val="000000"/>
+                </a:solidFill>
                 <a:latin typeface="Arial"/>
               </a:rPr>
               <a:t>Саратов 2024</a:t>
             </a:r>
-            <a:endParaRPr b="0" lang="en-US" sz="3200" strike="noStrike" u="none">
-              <a:solidFill>
-                <a:srgbClr val="000000"/>
-              </a:solidFill>
-              <a:uFillTx/>
+            <a:endParaRPr b="0" lang="en-US" sz="3200" spc="-1" strike="noStrike">
+              <a:solidFill>
+                <a:srgbClr val="000000"/>
+              </a:solidFill>
               <a:latin typeface="Arial"/>
             </a:endParaRPr>
           </a:p>
@@ -1061,7 +1588,7 @@
       </p:grpSpPr>
       <p:sp>
         <p:nvSpPr>
-          <p:cNvPr id="28" name="PlaceHolder 1"/>
+          <p:cNvPr id="33" name="PlaceHolder 1"/>
           <p:cNvSpPr>
             <a:spLocks noGrp="1"/>
           </p:cNvSpPr>
@@ -1072,7 +1599,7 @@
         <p:spPr>
           <a:xfrm>
             <a:off x="457200" y="2286000"/>
-            <a:ext cx="9071640" cy="946440"/>
+            <a:ext cx="9070560" cy="945360"/>
           </a:xfrm>
           <a:prstGeom prst="rect">
             <a:avLst/>
@@ -1088,23 +1615,27 @@
           </a:bodyPr>
           <a:p>
             <a:pPr indent="0" algn="ctr">
+              <a:lnSpc>
+                <a:spcPct val="100000"/>
+              </a:lnSpc>
               <a:buNone/>
-            </a:pPr>
-            <a:r>
-              <a:rPr b="0" lang="en-US" sz="4400" strike="noStrike" u="none">
-                <a:solidFill>
-                  <a:srgbClr val="000000"/>
-                </a:solidFill>
-                <a:uFillTx/>
+              <a:tabLst>
+                <a:tab algn="l" pos="0"/>
+              </a:tabLst>
+            </a:pPr>
+            <a:r>
+              <a:rPr b="0" lang="en-US" sz="4400" spc="-1" strike="noStrike">
+                <a:solidFill>
+                  <a:srgbClr val="000000"/>
+                </a:solidFill>
                 <a:latin typeface="Arial"/>
               </a:rPr>
               <a:t>Спасибо за внимание!</a:t>
             </a:r>
-            <a:endParaRPr b="0" lang="en-US" sz="4400" strike="noStrike" u="none">
-              <a:solidFill>
-                <a:srgbClr val="000000"/>
-              </a:solidFill>
-              <a:uFillTx/>
+            <a:endParaRPr b="0" lang="en-US" sz="4400" spc="-1" strike="noStrike">
+              <a:solidFill>
+                <a:srgbClr val="000000"/>
+              </a:solidFill>
               <a:latin typeface="Arial"/>
             </a:endParaRPr>
           </a:p>
@@ -1142,7 +1673,7 @@
       </p:grpSpPr>
       <p:sp>
         <p:nvSpPr>
-          <p:cNvPr id="11" name="PlaceHolder 1"/>
+          <p:cNvPr id="16" name="PlaceHolder 1"/>
           <p:cNvSpPr>
             <a:spLocks noGrp="1"/>
           </p:cNvSpPr>
@@ -1153,7 +1684,7 @@
         <p:spPr>
           <a:xfrm>
             <a:off x="504000" y="226080"/>
-            <a:ext cx="9071640" cy="946440"/>
+            <a:ext cx="9070560" cy="945360"/>
           </a:xfrm>
           <a:prstGeom prst="rect">
             <a:avLst/>
@@ -1169,23 +1700,27 @@
           </a:bodyPr>
           <a:p>
             <a:pPr indent="0" algn="ctr">
+              <a:lnSpc>
+                <a:spcPct val="100000"/>
+              </a:lnSpc>
               <a:buNone/>
-            </a:pPr>
-            <a:r>
-              <a:rPr b="0" lang="en-US" sz="4400" strike="noStrike" u="none">
-                <a:solidFill>
-                  <a:srgbClr val="000000"/>
-                </a:solidFill>
-                <a:uFillTx/>
+              <a:tabLst>
+                <a:tab algn="l" pos="0"/>
+              </a:tabLst>
+            </a:pPr>
+            <a:r>
+              <a:rPr b="0" lang="en-US" sz="4400" spc="-1" strike="noStrike">
+                <a:solidFill>
+                  <a:srgbClr val="000000"/>
+                </a:solidFill>
                 <a:latin typeface="Arial"/>
               </a:rPr>
               <a:t>Актуальность и мотивировка</a:t>
             </a:r>
-            <a:endParaRPr b="0" lang="en-US" sz="4400" strike="noStrike" u="none">
-              <a:solidFill>
-                <a:srgbClr val="000000"/>
-              </a:solidFill>
-              <a:uFillTx/>
+            <a:endParaRPr b="0" lang="en-US" sz="4400" spc="-1" strike="noStrike">
+              <a:solidFill>
+                <a:srgbClr val="000000"/>
+              </a:solidFill>
               <a:latin typeface="Arial"/>
             </a:endParaRPr>
           </a:p>
@@ -1193,7 +1728,7 @@
       </p:sp>
       <p:sp>
         <p:nvSpPr>
-          <p:cNvPr id="12" name="PlaceHolder 2"/>
+          <p:cNvPr id="17" name="PlaceHolder 2"/>
           <p:cNvSpPr>
             <a:spLocks noGrp="1"/>
           </p:cNvSpPr>
@@ -1204,7 +1739,7 @@
         <p:spPr>
           <a:xfrm>
             <a:off x="504000" y="1326600"/>
-            <a:ext cx="9071640" cy="3288240"/>
+            <a:ext cx="9070560" cy="3287160"/>
           </a:xfrm>
           <a:prstGeom prst="rect">
             <a:avLst/>
@@ -1220,6 +1755,9 @@
           </a:bodyPr>
           <a:p>
             <a:pPr marL="432000" indent="-324000">
+              <a:lnSpc>
+                <a:spcPct val="100000"/>
+              </a:lnSpc>
               <a:spcBef>
                 <a:spcPts val="1191"/>
               </a:spcBef>
@@ -1233,25 +1771,26 @@
               <a:buAutoNum type="arabicPeriod"/>
             </a:pPr>
             <a:r>
-              <a:rPr b="0" lang="en-US" sz="2000" strike="noStrike" u="none">
-                <a:solidFill>
-                  <a:srgbClr val="000000"/>
-                </a:solidFill>
-                <a:uFillTx/>
+              <a:rPr b="0" lang="en-US" sz="2000" spc="-1" strike="noStrike">
+                <a:solidFill>
+                  <a:srgbClr val="000000"/>
+                </a:solidFill>
                 <a:latin typeface="Arial"/>
               </a:rPr>
               <a:t>Мусор на улицах негативно влияет на здоровье людей и экосистемы</a:t>
             </a:r>
-            <a:endParaRPr b="0" lang="en-US" sz="2000" strike="noStrike" u="none">
-              <a:solidFill>
-                <a:srgbClr val="000000"/>
-              </a:solidFill>
-              <a:uFillTx/>
+            <a:endParaRPr b="0" lang="en-US" sz="2000" spc="-1" strike="noStrike">
+              <a:solidFill>
+                <a:srgbClr val="000000"/>
+              </a:solidFill>
               <a:latin typeface="Arial"/>
             </a:endParaRPr>
           </a:p>
           <a:p>
             <a:pPr marL="432000" indent="-324000">
+              <a:lnSpc>
+                <a:spcPct val="100000"/>
+              </a:lnSpc>
               <a:spcBef>
                 <a:spcPts val="1191"/>
               </a:spcBef>
@@ -1265,25 +1804,26 @@
               <a:buAutoNum type="arabicPeriod"/>
             </a:pPr>
             <a:r>
-              <a:rPr b="0" lang="en-US" sz="2000" strike="noStrike" u="none">
-                <a:solidFill>
-                  <a:srgbClr val="000000"/>
-                </a:solidFill>
-                <a:uFillTx/>
+              <a:rPr b="0" lang="en-US" sz="2000" spc="-1" strike="noStrike">
+                <a:solidFill>
+                  <a:srgbClr val="000000"/>
+                </a:solidFill>
                 <a:latin typeface="Arial"/>
               </a:rPr>
               <a:t>Утилизация усложняется нехваткой ресурсов и низкой осведомлённостью населения</a:t>
             </a:r>
-            <a:endParaRPr b="0" lang="en-US" sz="2000" strike="noStrike" u="none">
-              <a:solidFill>
-                <a:srgbClr val="000000"/>
-              </a:solidFill>
-              <a:uFillTx/>
+            <a:endParaRPr b="0" lang="en-US" sz="2000" spc="-1" strike="noStrike">
+              <a:solidFill>
+                <a:srgbClr val="000000"/>
+              </a:solidFill>
               <a:latin typeface="Arial"/>
             </a:endParaRPr>
           </a:p>
           <a:p>
             <a:pPr marL="432000" indent="-324000">
+              <a:lnSpc>
+                <a:spcPct val="100000"/>
+              </a:lnSpc>
               <a:spcBef>
                 <a:spcPts val="1191"/>
               </a:spcBef>
@@ -1297,25 +1837,26 @@
               <a:buAutoNum type="arabicPeriod"/>
             </a:pPr>
             <a:r>
-              <a:rPr b="0" lang="en-US" sz="2000" strike="noStrike" u="none">
-                <a:solidFill>
-                  <a:srgbClr val="000000"/>
-                </a:solidFill>
-                <a:uFillTx/>
+              <a:rPr b="0" lang="en-US" sz="2000" spc="-1" strike="noStrike">
+                <a:solidFill>
+                  <a:srgbClr val="000000"/>
+                </a:solidFill>
                 <a:latin typeface="Arial"/>
               </a:rPr>
               <a:t>Мобильные приложения могут улучшить взаимодействие граждан и служб, ускоряя процесс уборки</a:t>
             </a:r>
-            <a:endParaRPr b="0" lang="en-US" sz="2000" strike="noStrike" u="none">
-              <a:solidFill>
-                <a:srgbClr val="000000"/>
-              </a:solidFill>
-              <a:uFillTx/>
+            <a:endParaRPr b="0" lang="en-US" sz="2000" spc="-1" strike="noStrike">
+              <a:solidFill>
+                <a:srgbClr val="000000"/>
+              </a:solidFill>
               <a:latin typeface="Arial"/>
             </a:endParaRPr>
           </a:p>
           <a:p>
             <a:pPr marL="432000" indent="-324000">
+              <a:lnSpc>
+                <a:spcPct val="100000"/>
+              </a:lnSpc>
               <a:spcBef>
                 <a:spcPts val="1191"/>
               </a:spcBef>
@@ -1329,20 +1870,18 @@
               <a:buAutoNum type="arabicPeriod"/>
             </a:pPr>
             <a:r>
-              <a:rPr b="0" lang="en-US" sz="2000" strike="noStrike" u="none">
-                <a:solidFill>
-                  <a:srgbClr val="000000"/>
-                </a:solidFill>
-                <a:uFillTx/>
+              <a:rPr b="0" lang="en-US" sz="2000" spc="-1" strike="noStrike">
+                <a:solidFill>
+                  <a:srgbClr val="000000"/>
+                </a:solidFill>
                 <a:latin typeface="Arial"/>
               </a:rPr>
               <a:t>Приложение позволит сообщать о мусоре, помогать службам реагировать быстрее и создавать сообщество, заботящееся о чистоте</a:t>
             </a:r>
-            <a:endParaRPr b="0" lang="en-US" sz="2000" strike="noStrike" u="none">
-              <a:solidFill>
-                <a:srgbClr val="000000"/>
-              </a:solidFill>
-              <a:uFillTx/>
+            <a:endParaRPr b="0" lang="en-US" sz="2000" spc="-1" strike="noStrike">
+              <a:solidFill>
+                <a:srgbClr val="000000"/>
+              </a:solidFill>
               <a:latin typeface="Arial"/>
             </a:endParaRPr>
           </a:p>
@@ -1380,7 +1919,7 @@
       </p:grpSpPr>
       <p:sp>
         <p:nvSpPr>
-          <p:cNvPr id="13" name="PlaceHolder 1"/>
+          <p:cNvPr id="18" name="PlaceHolder 1"/>
           <p:cNvSpPr>
             <a:spLocks noGrp="1"/>
           </p:cNvSpPr>
@@ -1391,7 +1930,7 @@
         <p:spPr>
           <a:xfrm>
             <a:off x="504000" y="226080"/>
-            <a:ext cx="9071640" cy="946440"/>
+            <a:ext cx="9070560" cy="945360"/>
           </a:xfrm>
           <a:prstGeom prst="rect">
             <a:avLst/>
@@ -1407,23 +1946,27 @@
           </a:bodyPr>
           <a:p>
             <a:pPr indent="0" algn="ctr">
+              <a:lnSpc>
+                <a:spcPct val="100000"/>
+              </a:lnSpc>
               <a:buNone/>
-            </a:pPr>
-            <a:r>
-              <a:rPr b="0" lang="en-US" sz="4400" strike="noStrike" u="none">
-                <a:solidFill>
-                  <a:srgbClr val="000000"/>
-                </a:solidFill>
-                <a:uFillTx/>
+              <a:tabLst>
+                <a:tab algn="l" pos="0"/>
+              </a:tabLst>
+            </a:pPr>
+            <a:r>
+              <a:rPr b="0" lang="en-US" sz="4400" spc="-1" strike="noStrike">
+                <a:solidFill>
+                  <a:srgbClr val="000000"/>
+                </a:solidFill>
                 <a:latin typeface="Arial"/>
               </a:rPr>
               <a:t>Постановка задачи</a:t>
             </a:r>
-            <a:endParaRPr b="0" lang="en-US" sz="4400" strike="noStrike" u="none">
-              <a:solidFill>
-                <a:srgbClr val="000000"/>
-              </a:solidFill>
-              <a:uFillTx/>
+            <a:endParaRPr b="0" lang="en-US" sz="4400" spc="-1" strike="noStrike">
+              <a:solidFill>
+                <a:srgbClr val="000000"/>
+              </a:solidFill>
               <a:latin typeface="Arial"/>
             </a:endParaRPr>
           </a:p>
@@ -1431,7 +1974,7 @@
       </p:sp>
       <p:sp>
         <p:nvSpPr>
-          <p:cNvPr id="14" name="PlaceHolder 2"/>
+          <p:cNvPr id="19" name="PlaceHolder 2"/>
           <p:cNvSpPr>
             <a:spLocks noGrp="1"/>
           </p:cNvSpPr>
@@ -1442,7 +1985,7 @@
         <p:spPr>
           <a:xfrm>
             <a:off x="457200" y="1371600"/>
-            <a:ext cx="9144000" cy="2057400"/>
+            <a:ext cx="9142920" cy="2056320"/>
           </a:xfrm>
           <a:prstGeom prst="rect">
             <a:avLst/>
@@ -1458,6 +2001,9 @@
           </a:bodyPr>
           <a:p>
             <a:pPr marL="432000" indent="-324000">
+              <a:lnSpc>
+                <a:spcPct val="100000"/>
+              </a:lnSpc>
               <a:spcBef>
                 <a:spcPts val="1417"/>
               </a:spcBef>
@@ -1468,25 +2014,26 @@
               <a:buAutoNum type="arabicPeriod"/>
             </a:pPr>
             <a:r>
-              <a:rPr b="0" lang="en-US" sz="2000" strike="noStrike" u="none">
-                <a:solidFill>
-                  <a:srgbClr val="000000"/>
-                </a:solidFill>
-                <a:uFillTx/>
+              <a:rPr b="0" lang="en-US" sz="2000" spc="-1" strike="noStrike">
+                <a:solidFill>
+                  <a:srgbClr val="000000"/>
+                </a:solidFill>
                 <a:latin typeface="Arial"/>
               </a:rPr>
               <a:t>Рассмотреть используемые технологии, описать преимущества выбранного стека</a:t>
             </a:r>
-            <a:endParaRPr b="0" lang="en-US" sz="2000" strike="noStrike" u="none">
-              <a:solidFill>
-                <a:srgbClr val="000000"/>
-              </a:solidFill>
-              <a:uFillTx/>
+            <a:endParaRPr b="0" lang="en-US" sz="2000" spc="-1" strike="noStrike">
+              <a:solidFill>
+                <a:srgbClr val="000000"/>
+              </a:solidFill>
               <a:latin typeface="Arial"/>
             </a:endParaRPr>
           </a:p>
           <a:p>
             <a:pPr marL="432000" indent="-324000">
+              <a:lnSpc>
+                <a:spcPct val="100000"/>
+              </a:lnSpc>
               <a:spcBef>
                 <a:spcPts val="1417"/>
               </a:spcBef>
@@ -1497,25 +2044,26 @@
               <a:buAutoNum type="arabicPeriod"/>
             </a:pPr>
             <a:r>
-              <a:rPr b="0" lang="en-US" sz="2000" strike="noStrike" u="none">
-                <a:solidFill>
-                  <a:srgbClr val="000000"/>
-                </a:solidFill>
-                <a:uFillTx/>
+              <a:rPr b="0" lang="en-US" sz="2000" spc="-1" strike="noStrike">
+                <a:solidFill>
+                  <a:srgbClr val="000000"/>
+                </a:solidFill>
                 <a:latin typeface="Arial"/>
               </a:rPr>
               <a:t>Описать архитектуру и структуру построенной информационной системы, backend- и database-сервисов</a:t>
             </a:r>
-            <a:endParaRPr b="0" lang="en-US" sz="2000" strike="noStrike" u="none">
-              <a:solidFill>
-                <a:srgbClr val="000000"/>
-              </a:solidFill>
-              <a:uFillTx/>
+            <a:endParaRPr b="0" lang="en-US" sz="2000" spc="-1" strike="noStrike">
+              <a:solidFill>
+                <a:srgbClr val="000000"/>
+              </a:solidFill>
               <a:latin typeface="Arial"/>
             </a:endParaRPr>
           </a:p>
           <a:p>
             <a:pPr marL="432000" indent="-324000">
+              <a:lnSpc>
+                <a:spcPct val="100000"/>
+              </a:lnSpc>
               <a:spcBef>
                 <a:spcPts val="1417"/>
               </a:spcBef>
@@ -1526,20 +2074,18 @@
               <a:buAutoNum type="arabicPeriod"/>
             </a:pPr>
             <a:r>
-              <a:rPr b="0" lang="en-US" sz="2000" strike="noStrike" u="none">
-                <a:solidFill>
-                  <a:srgbClr val="000000"/>
-                </a:solidFill>
-                <a:uFillTx/>
+              <a:rPr b="0" lang="en-US" sz="2000" spc="-1" strike="noStrike">
+                <a:solidFill>
+                  <a:srgbClr val="000000"/>
+                </a:solidFill>
                 <a:latin typeface="Arial"/>
               </a:rPr>
               <a:t>Реализовать это с помощью выбранных инструментов</a:t>
             </a:r>
-            <a:endParaRPr b="0" lang="en-US" sz="2000" strike="noStrike" u="none">
-              <a:solidFill>
-                <a:srgbClr val="000000"/>
-              </a:solidFill>
-              <a:uFillTx/>
+            <a:endParaRPr b="0" lang="en-US" sz="2000" spc="-1" strike="noStrike">
+              <a:solidFill>
+                <a:srgbClr val="000000"/>
+              </a:solidFill>
               <a:latin typeface="Arial"/>
             </a:endParaRPr>
           </a:p>
@@ -1577,7 +2123,7 @@
       </p:grpSpPr>
       <p:sp>
         <p:nvSpPr>
-          <p:cNvPr id="15" name="PlaceHolder 1"/>
+          <p:cNvPr id="20" name="PlaceHolder 1"/>
           <p:cNvSpPr>
             <a:spLocks noGrp="1"/>
           </p:cNvSpPr>
@@ -1588,7 +2134,7 @@
         <p:spPr>
           <a:xfrm>
             <a:off x="504000" y="226080"/>
-            <a:ext cx="9071640" cy="946440"/>
+            <a:ext cx="9070560" cy="945360"/>
           </a:xfrm>
           <a:prstGeom prst="rect">
             <a:avLst/>
@@ -1604,23 +2150,27 @@
           </a:bodyPr>
           <a:p>
             <a:pPr indent="0" algn="ctr">
+              <a:lnSpc>
+                <a:spcPct val="100000"/>
+              </a:lnSpc>
               <a:buNone/>
-            </a:pPr>
-            <a:r>
-              <a:rPr b="0" lang="en-US" sz="4400" strike="noStrike" u="none">
-                <a:solidFill>
-                  <a:srgbClr val="000000"/>
-                </a:solidFill>
-                <a:uFillTx/>
+              <a:tabLst>
+                <a:tab algn="l" pos="0"/>
+              </a:tabLst>
+            </a:pPr>
+            <a:r>
+              <a:rPr b="0" lang="en-US" sz="4400" spc="-1" strike="noStrike">
+                <a:solidFill>
+                  <a:srgbClr val="000000"/>
+                </a:solidFill>
                 <a:latin typeface="Arial"/>
               </a:rPr>
               <a:t>Используемые технологии</a:t>
             </a:r>
-            <a:endParaRPr b="0" lang="en-US" sz="4400" strike="noStrike" u="none">
-              <a:solidFill>
-                <a:srgbClr val="000000"/>
-              </a:solidFill>
-              <a:uFillTx/>
+            <a:endParaRPr b="0" lang="en-US" sz="4400" spc="-1" strike="noStrike">
+              <a:solidFill>
+                <a:srgbClr val="000000"/>
+              </a:solidFill>
               <a:latin typeface="Arial"/>
             </a:endParaRPr>
           </a:p>
@@ -1628,7 +2178,7 @@
       </p:sp>
       <p:sp>
         <p:nvSpPr>
-          <p:cNvPr id="16" name="PlaceHolder 2"/>
+          <p:cNvPr id="21" name="PlaceHolder 2"/>
           <p:cNvSpPr>
             <a:spLocks noGrp="1"/>
           </p:cNvSpPr>
@@ -1639,7 +2189,7 @@
         <p:spPr>
           <a:xfrm>
             <a:off x="504000" y="1326600"/>
-            <a:ext cx="9071640" cy="3288240"/>
+            <a:ext cx="9070560" cy="3287160"/>
           </a:xfrm>
           <a:prstGeom prst="rect">
             <a:avLst/>
@@ -1655,6 +2205,9 @@
           </a:bodyPr>
           <a:p>
             <a:pPr marL="432000" indent="-324000">
+              <a:lnSpc>
+                <a:spcPct val="100000"/>
+              </a:lnSpc>
               <a:spcBef>
                 <a:spcPts val="1417"/>
               </a:spcBef>
@@ -1665,35 +2218,35 @@
               <a:buAutoNum type="arabicPeriod"/>
             </a:pPr>
             <a:r>
-              <a:rPr b="0" lang="en-US" sz="2000" strike="noStrike" u="none">
-                <a:solidFill>
-                  <a:srgbClr val="000000"/>
-                </a:solidFill>
-                <a:uFillTx/>
+              <a:rPr b="0" lang="en-US" sz="2000" spc="-1" strike="noStrike">
+                <a:solidFill>
+                  <a:srgbClr val="000000"/>
+                </a:solidFill>
                 <a:latin typeface="Arial"/>
               </a:rPr>
               <a:t> </a:t>
             </a:r>
             <a:r>
-              <a:rPr b="0" lang="en-US" sz="2000" strike="noStrike" u="none">
-                <a:solidFill>
-                  <a:srgbClr val="000000"/>
-                </a:solidFill>
-                <a:uFillTx/>
+              <a:rPr b="0" lang="en-US" sz="2000" spc="-1" strike="noStrike">
+                <a:solidFill>
+                  <a:srgbClr val="000000"/>
+                </a:solidFill>
                 <a:latin typeface="Arial"/>
               </a:rPr>
               <a:t>FastAPI</a:t>
             </a:r>
-            <a:endParaRPr b="0" lang="en-US" sz="2000" strike="noStrike" u="none">
-              <a:solidFill>
-                <a:srgbClr val="000000"/>
-              </a:solidFill>
-              <a:uFillTx/>
+            <a:endParaRPr b="0" lang="en-US" sz="2000" spc="-1" strike="noStrike">
+              <a:solidFill>
+                <a:srgbClr val="000000"/>
+              </a:solidFill>
               <a:latin typeface="Arial"/>
             </a:endParaRPr>
           </a:p>
           <a:p>
             <a:pPr marL="432000" indent="-324000">
+              <a:lnSpc>
+                <a:spcPct val="100000"/>
+              </a:lnSpc>
               <a:spcBef>
                 <a:spcPts val="1417"/>
               </a:spcBef>
@@ -1704,35 +2257,35 @@
               <a:buAutoNum type="arabicPeriod"/>
             </a:pPr>
             <a:r>
-              <a:rPr b="0" lang="en-US" sz="2000" strike="noStrike" u="none">
-                <a:solidFill>
-                  <a:srgbClr val="000000"/>
-                </a:solidFill>
-                <a:uFillTx/>
+              <a:rPr b="0" lang="en-US" sz="2000" spc="-1" strike="noStrike">
+                <a:solidFill>
+                  <a:srgbClr val="000000"/>
+                </a:solidFill>
                 <a:latin typeface="Arial"/>
               </a:rPr>
               <a:t> </a:t>
             </a:r>
             <a:r>
-              <a:rPr b="0" lang="en-US" sz="2000" strike="noStrike" u="none">
-                <a:solidFill>
-                  <a:srgbClr val="000000"/>
-                </a:solidFill>
-                <a:uFillTx/>
+              <a:rPr b="0" lang="en-US" sz="2000" spc="-1" strike="noStrike">
+                <a:solidFill>
+                  <a:srgbClr val="000000"/>
+                </a:solidFill>
                 <a:latin typeface="Arial"/>
               </a:rPr>
               <a:t>PostgreSQL</a:t>
             </a:r>
-            <a:endParaRPr b="0" lang="en-US" sz="2000" strike="noStrike" u="none">
-              <a:solidFill>
-                <a:srgbClr val="000000"/>
-              </a:solidFill>
-              <a:uFillTx/>
+            <a:endParaRPr b="0" lang="en-US" sz="2000" spc="-1" strike="noStrike">
+              <a:solidFill>
+                <a:srgbClr val="000000"/>
+              </a:solidFill>
               <a:latin typeface="Arial"/>
             </a:endParaRPr>
           </a:p>
           <a:p>
             <a:pPr marL="432000" indent="-324000">
+              <a:lnSpc>
+                <a:spcPct val="100000"/>
+              </a:lnSpc>
               <a:spcBef>
                 <a:spcPts val="1417"/>
               </a:spcBef>
@@ -1743,35 +2296,35 @@
               <a:buAutoNum type="arabicPeriod"/>
             </a:pPr>
             <a:r>
-              <a:rPr b="0" lang="en-US" sz="2000" strike="noStrike" u="none">
-                <a:solidFill>
-                  <a:srgbClr val="000000"/>
-                </a:solidFill>
-                <a:uFillTx/>
+              <a:rPr b="0" lang="en-US" sz="2000" spc="-1" strike="noStrike">
+                <a:solidFill>
+                  <a:srgbClr val="000000"/>
+                </a:solidFill>
                 <a:latin typeface="Arial"/>
               </a:rPr>
               <a:t> </a:t>
             </a:r>
             <a:r>
-              <a:rPr b="0" lang="en-US" sz="2000" strike="noStrike" u="none">
-                <a:solidFill>
-                  <a:srgbClr val="000000"/>
-                </a:solidFill>
-                <a:uFillTx/>
+              <a:rPr b="0" lang="en-US" sz="2000" spc="-1" strike="noStrike">
+                <a:solidFill>
+                  <a:srgbClr val="000000"/>
+                </a:solidFill>
                 <a:latin typeface="Arial"/>
               </a:rPr>
               <a:t>Alembic и sqlalchemy</a:t>
             </a:r>
-            <a:endParaRPr b="0" lang="en-US" sz="2000" strike="noStrike" u="none">
-              <a:solidFill>
-                <a:srgbClr val="000000"/>
-              </a:solidFill>
-              <a:uFillTx/>
+            <a:endParaRPr b="0" lang="en-US" sz="2000" spc="-1" strike="noStrike">
+              <a:solidFill>
+                <a:srgbClr val="000000"/>
+              </a:solidFill>
               <a:latin typeface="Arial"/>
             </a:endParaRPr>
           </a:p>
           <a:p>
             <a:pPr marL="432000" indent="-324000">
+              <a:lnSpc>
+                <a:spcPct val="100000"/>
+              </a:lnSpc>
               <a:spcBef>
                 <a:spcPts val="1417"/>
               </a:spcBef>
@@ -1782,35 +2335,35 @@
               <a:buAutoNum type="arabicPeriod"/>
             </a:pPr>
             <a:r>
-              <a:rPr b="0" lang="en-US" sz="2000" strike="noStrike" u="none">
-                <a:solidFill>
-                  <a:srgbClr val="000000"/>
-                </a:solidFill>
-                <a:uFillTx/>
+              <a:rPr b="0" lang="en-US" sz="2000" spc="-1" strike="noStrike">
+                <a:solidFill>
+                  <a:srgbClr val="000000"/>
+                </a:solidFill>
                 <a:latin typeface="Arial"/>
               </a:rPr>
               <a:t> </a:t>
             </a:r>
             <a:r>
-              <a:rPr b="0" lang="en-US" sz="2000" strike="noStrike" u="none">
-                <a:solidFill>
-                  <a:srgbClr val="000000"/>
-                </a:solidFill>
-                <a:uFillTx/>
+              <a:rPr b="0" lang="en-US" sz="2000" spc="-1" strike="noStrike">
+                <a:solidFill>
+                  <a:srgbClr val="000000"/>
+                </a:solidFill>
                 <a:latin typeface="Arial"/>
               </a:rPr>
               <a:t>Docker и docker-compose</a:t>
             </a:r>
-            <a:endParaRPr b="0" lang="en-US" sz="2000" strike="noStrike" u="none">
-              <a:solidFill>
-                <a:srgbClr val="000000"/>
-              </a:solidFill>
-              <a:uFillTx/>
+            <a:endParaRPr b="0" lang="en-US" sz="2000" spc="-1" strike="noStrike">
+              <a:solidFill>
+                <a:srgbClr val="000000"/>
+              </a:solidFill>
               <a:latin typeface="Arial"/>
             </a:endParaRPr>
           </a:p>
           <a:p>
             <a:pPr marL="432000" indent="-324000">
+              <a:lnSpc>
+                <a:spcPct val="100000"/>
+              </a:lnSpc>
               <a:spcBef>
                 <a:spcPts val="1417"/>
               </a:spcBef>
@@ -1821,30 +2374,27 @@
               <a:buAutoNum type="arabicPeriod"/>
             </a:pPr>
             <a:r>
-              <a:rPr b="0" lang="en-US" sz="2000" strike="noStrike" u="none">
-                <a:solidFill>
-                  <a:srgbClr val="000000"/>
-                </a:solidFill>
-                <a:uFillTx/>
+              <a:rPr b="0" lang="en-US" sz="2000" spc="-1" strike="noStrike">
+                <a:solidFill>
+                  <a:srgbClr val="000000"/>
+                </a:solidFill>
                 <a:latin typeface="Arial"/>
               </a:rPr>
               <a:t> </a:t>
             </a:r>
             <a:r>
-              <a:rPr b="0" lang="en-US" sz="2000" strike="noStrike" u="none">
-                <a:solidFill>
-                  <a:srgbClr val="000000"/>
-                </a:solidFill>
-                <a:uFillTx/>
+              <a:rPr b="0" lang="en-US" sz="2000" spc="-1" strike="noStrike">
+                <a:solidFill>
+                  <a:srgbClr val="000000"/>
+                </a:solidFill>
                 <a:latin typeface="Arial"/>
               </a:rPr>
               <a:t>Postman и Dbeaver в качестве вспомогательных</a:t>
             </a:r>
-            <a:endParaRPr b="0" lang="en-US" sz="2000" strike="noStrike" u="none">
-              <a:solidFill>
-                <a:srgbClr val="000000"/>
-              </a:solidFill>
-              <a:uFillTx/>
+            <a:endParaRPr b="0" lang="en-US" sz="2000" spc="-1" strike="noStrike">
+              <a:solidFill>
+                <a:srgbClr val="000000"/>
+              </a:solidFill>
               <a:latin typeface="Arial"/>
             </a:endParaRPr>
           </a:p>
@@ -1882,7 +2432,7 @@
       </p:grpSpPr>
       <p:sp>
         <p:nvSpPr>
-          <p:cNvPr id="17" name="PlaceHolder 1"/>
+          <p:cNvPr id="22" name="PlaceHolder 1"/>
           <p:cNvSpPr>
             <a:spLocks noGrp="1"/>
           </p:cNvSpPr>
@@ -1893,7 +2443,7 @@
         <p:spPr>
           <a:xfrm>
             <a:off x="504000" y="226080"/>
-            <a:ext cx="9071640" cy="946440"/>
+            <a:ext cx="9070560" cy="945360"/>
           </a:xfrm>
           <a:prstGeom prst="rect">
             <a:avLst/>
@@ -1909,23 +2459,27 @@
           </a:bodyPr>
           <a:p>
             <a:pPr indent="0" algn="ctr">
+              <a:lnSpc>
+                <a:spcPct val="100000"/>
+              </a:lnSpc>
               <a:buNone/>
-            </a:pPr>
-            <a:r>
-              <a:rPr b="0" lang="en-US" sz="4400" strike="noStrike" u="none">
-                <a:solidFill>
-                  <a:srgbClr val="000000"/>
-                </a:solidFill>
-                <a:uFillTx/>
+              <a:tabLst>
+                <a:tab algn="l" pos="0"/>
+              </a:tabLst>
+            </a:pPr>
+            <a:r>
+              <a:rPr b="0" lang="en-US" sz="4400" spc="-1" strike="noStrike">
+                <a:solidFill>
+                  <a:srgbClr val="000000"/>
+                </a:solidFill>
                 <a:latin typeface="Arial"/>
               </a:rPr>
               <a:t>Реализация</a:t>
             </a:r>
-            <a:endParaRPr b="0" lang="en-US" sz="4400" strike="noStrike" u="none">
-              <a:solidFill>
-                <a:srgbClr val="000000"/>
-              </a:solidFill>
-              <a:uFillTx/>
+            <a:endParaRPr b="0" lang="en-US" sz="4400" spc="-1" strike="noStrike">
+              <a:solidFill>
+                <a:srgbClr val="000000"/>
+              </a:solidFill>
               <a:latin typeface="Arial"/>
             </a:endParaRPr>
           </a:p>
@@ -1933,7 +2487,7 @@
       </p:sp>
       <p:sp>
         <p:nvSpPr>
-          <p:cNvPr id="18" name="PlaceHolder 2"/>
+          <p:cNvPr id="23" name="PlaceHolder 2"/>
           <p:cNvSpPr>
             <a:spLocks noGrp="1"/>
           </p:cNvSpPr>
@@ -1944,7 +2498,7 @@
         <p:spPr>
           <a:xfrm>
             <a:off x="504000" y="1326600"/>
-            <a:ext cx="9071640" cy="3288240"/>
+            <a:ext cx="9070560" cy="3287160"/>
           </a:xfrm>
           <a:prstGeom prst="rect">
             <a:avLst/>
@@ -1965,11 +2519,10 @@
               </a:spcBef>
               <a:buNone/>
             </a:pPr>
-            <a:endParaRPr b="0" lang="en-US" sz="3200" strike="noStrike" u="none">
-              <a:solidFill>
-                <a:srgbClr val="000000"/>
-              </a:solidFill>
-              <a:uFillTx/>
+            <a:endParaRPr b="0" lang="en-US" sz="1800" spc="-1" strike="noStrike">
+              <a:solidFill>
+                <a:srgbClr val="000000"/>
+              </a:solidFill>
               <a:latin typeface="Arial"/>
             </a:endParaRPr>
           </a:p>
@@ -1977,7 +2530,7 @@
       </p:sp>
       <p:pic>
         <p:nvPicPr>
-          <p:cNvPr id="19" name="" descr=""/>
+          <p:cNvPr id="24" name="" descr=""/>
           <p:cNvPicPr/>
           <p:nvPr/>
         </p:nvPicPr>
@@ -1988,7 +2541,7 @@
         <p:spPr>
           <a:xfrm>
             <a:off x="457200" y="1172520"/>
-            <a:ext cx="9285120" cy="3856680"/>
+            <a:ext cx="9284040" cy="3855600"/>
           </a:xfrm>
           <a:prstGeom prst="rect">
             <a:avLst/>
@@ -2030,7 +2583,7 @@
       </p:grpSpPr>
       <p:sp>
         <p:nvSpPr>
-          <p:cNvPr id="20" name="PlaceHolder 1"/>
+          <p:cNvPr id="25" name="PlaceHolder 1"/>
           <p:cNvSpPr>
             <a:spLocks noGrp="1"/>
           </p:cNvSpPr>
@@ -2041,7 +2594,7 @@
         <p:spPr>
           <a:xfrm>
             <a:off x="504000" y="226080"/>
-            <a:ext cx="9071640" cy="946440"/>
+            <a:ext cx="9070560" cy="945360"/>
           </a:xfrm>
           <a:prstGeom prst="rect">
             <a:avLst/>
@@ -2057,23 +2610,27 @@
           </a:bodyPr>
           <a:p>
             <a:pPr indent="0" algn="ctr">
+              <a:lnSpc>
+                <a:spcPct val="100000"/>
+              </a:lnSpc>
               <a:buNone/>
-            </a:pPr>
-            <a:r>
-              <a:rPr b="0" lang="en-US" sz="4400" strike="noStrike" u="none">
-                <a:solidFill>
-                  <a:srgbClr val="000000"/>
-                </a:solidFill>
-                <a:uFillTx/>
+              <a:tabLst>
+                <a:tab algn="l" pos="0"/>
+              </a:tabLst>
+            </a:pPr>
+            <a:r>
+              <a:rPr b="0" lang="en-US" sz="4400" spc="-1" strike="noStrike">
+                <a:solidFill>
+                  <a:srgbClr val="000000"/>
+                </a:solidFill>
                 <a:latin typeface="Arial"/>
               </a:rPr>
               <a:t>Реализация</a:t>
             </a:r>
-            <a:endParaRPr b="0" lang="en-US" sz="4400" strike="noStrike" u="none">
-              <a:solidFill>
-                <a:srgbClr val="000000"/>
-              </a:solidFill>
-              <a:uFillTx/>
+            <a:endParaRPr b="0" lang="en-US" sz="4400" spc="-1" strike="noStrike">
+              <a:solidFill>
+                <a:srgbClr val="000000"/>
+              </a:solidFill>
               <a:latin typeface="Arial"/>
             </a:endParaRPr>
           </a:p>
@@ -2081,7 +2638,7 @@
       </p:sp>
       <p:pic>
         <p:nvPicPr>
-          <p:cNvPr id="21" name="" descr=""/>
+          <p:cNvPr id="26" name="" descr=""/>
           <p:cNvPicPr/>
           <p:nvPr/>
         </p:nvPicPr>
@@ -2092,7 +2649,7 @@
         <p:spPr>
           <a:xfrm>
             <a:off x="3125160" y="1371600"/>
-            <a:ext cx="3732840" cy="3809160"/>
+            <a:ext cx="3731760" cy="3808080"/>
           </a:xfrm>
           <a:prstGeom prst="rect">
             <a:avLst/>
@@ -2134,7 +2691,7 @@
       </p:grpSpPr>
       <p:sp>
         <p:nvSpPr>
-          <p:cNvPr id="22" name="PlaceHolder 1"/>
+          <p:cNvPr id="27" name="PlaceHolder 1"/>
           <p:cNvSpPr>
             <a:spLocks noGrp="1"/>
           </p:cNvSpPr>
@@ -2145,7 +2702,7 @@
         <p:spPr>
           <a:xfrm>
             <a:off x="504000" y="226080"/>
-            <a:ext cx="9071640" cy="946440"/>
+            <a:ext cx="9070560" cy="945360"/>
           </a:xfrm>
           <a:prstGeom prst="rect">
             <a:avLst/>
@@ -2161,23 +2718,27 @@
           </a:bodyPr>
           <a:p>
             <a:pPr indent="0" algn="ctr">
+              <a:lnSpc>
+                <a:spcPct val="100000"/>
+              </a:lnSpc>
               <a:buNone/>
-            </a:pPr>
-            <a:r>
-              <a:rPr b="0" lang="en-US" sz="4400" strike="noStrike" u="none">
-                <a:solidFill>
-                  <a:srgbClr val="000000"/>
-                </a:solidFill>
-                <a:uFillTx/>
+              <a:tabLst>
+                <a:tab algn="l" pos="0"/>
+              </a:tabLst>
+            </a:pPr>
+            <a:r>
+              <a:rPr b="0" lang="en-US" sz="4400" spc="-1" strike="noStrike">
+                <a:solidFill>
+                  <a:srgbClr val="000000"/>
+                </a:solidFill>
                 <a:latin typeface="Arial"/>
               </a:rPr>
               <a:t>Результаты</a:t>
             </a:r>
-            <a:endParaRPr b="0" lang="en-US" sz="4400" strike="noStrike" u="none">
-              <a:solidFill>
-                <a:srgbClr val="000000"/>
-              </a:solidFill>
-              <a:uFillTx/>
+            <a:endParaRPr b="0" lang="en-US" sz="4400" spc="-1" strike="noStrike">
+              <a:solidFill>
+                <a:srgbClr val="000000"/>
+              </a:solidFill>
               <a:latin typeface="Arial"/>
             </a:endParaRPr>
           </a:p>
@@ -2185,7 +2746,7 @@
       </p:sp>
       <p:pic>
         <p:nvPicPr>
-          <p:cNvPr id="23" name="" descr=""/>
+          <p:cNvPr id="28" name="" descr=""/>
           <p:cNvPicPr/>
           <p:nvPr/>
         </p:nvPicPr>
@@ -2196,7 +2757,7 @@
         <p:spPr>
           <a:xfrm>
             <a:off x="1818000" y="1371600"/>
-            <a:ext cx="6411600" cy="3288240"/>
+            <a:ext cx="6410520" cy="3287160"/>
           </a:xfrm>
           <a:prstGeom prst="rect">
             <a:avLst/>
@@ -2238,7 +2799,7 @@
       </p:grpSpPr>
       <p:sp>
         <p:nvSpPr>
-          <p:cNvPr id="24" name="PlaceHolder 1"/>
+          <p:cNvPr id="29" name="PlaceHolder 1"/>
           <p:cNvSpPr>
             <a:spLocks noGrp="1"/>
           </p:cNvSpPr>
@@ -2248,8 +2809,8 @@
         </p:nvSpPr>
         <p:spPr>
           <a:xfrm>
-            <a:off x="300960" y="2286000"/>
-            <a:ext cx="5414040" cy="946440"/>
+            <a:off x="2130480" y="685800"/>
+            <a:ext cx="5412960" cy="945360"/>
           </a:xfrm>
           <a:prstGeom prst="rect">
             <a:avLst/>
@@ -2265,51 +2826,129 @@
           </a:bodyPr>
           <a:p>
             <a:pPr indent="0" algn="ctr">
+              <a:lnSpc>
+                <a:spcPct val="100000"/>
+              </a:lnSpc>
               <a:buNone/>
-            </a:pPr>
-            <a:r>
-              <a:rPr b="0" lang="en-US" sz="4400" strike="noStrike" u="none">
-                <a:solidFill>
-                  <a:srgbClr val="000000"/>
-                </a:solidFill>
-                <a:uFillTx/>
-                <a:latin typeface="Arial"/>
-              </a:rPr>
-              <a:t>Результаты</a:t>
-            </a:r>
-            <a:endParaRPr b="0" lang="en-US" sz="4400" strike="noStrike" u="none">
-              <a:solidFill>
-                <a:srgbClr val="000000"/>
-              </a:solidFill>
-              <a:uFillTx/>
+              <a:tabLst>
+                <a:tab algn="l" pos="0"/>
+              </a:tabLst>
+            </a:pPr>
+            <a:r>
+              <a:rPr b="0" lang="en-US" sz="4400" spc="-1" strike="noStrike">
+                <a:solidFill>
+                  <a:srgbClr val="000000"/>
+                </a:solidFill>
+                <a:latin typeface="Arial"/>
+              </a:rPr>
+              <a:t>Перспективы</a:t>
+            </a:r>
+            <a:endParaRPr b="0" lang="en-US" sz="4400" spc="-1" strike="noStrike">
+              <a:solidFill>
+                <a:srgbClr val="000000"/>
+              </a:solidFill>
               <a:latin typeface="Arial"/>
             </a:endParaRPr>
           </a:p>
         </p:txBody>
       </p:sp>
-      <p:pic>
-        <p:nvPicPr>
-          <p:cNvPr id="25" name="" descr=""/>
-          <p:cNvPicPr/>
+      <p:sp>
+        <p:nvSpPr>
+          <p:cNvPr id="30" name=""/>
+          <p:cNvSpPr/>
           <p:nvPr/>
-        </p:nvPicPr>
-        <p:blipFill>
-          <a:blip r:embed="rId1"/>
-          <a:stretch/>
-        </p:blipFill>
+        </p:nvSpPr>
         <p:spPr>
           <a:xfrm>
-            <a:off x="6629400" y="369360"/>
-            <a:ext cx="2743200" cy="4888440"/>
+            <a:off x="457200" y="2057400"/>
+            <a:ext cx="8915040" cy="2073600"/>
           </a:xfrm>
           <a:prstGeom prst="rect">
             <a:avLst/>
           </a:prstGeom>
+          <a:noFill/>
           <a:ln w="0">
             <a:noFill/>
           </a:ln>
         </p:spPr>
-      </p:pic>
+        <p:style>
+          <a:lnRef idx="0"/>
+          <a:fillRef idx="0"/>
+          <a:effectRef idx="0"/>
+          <a:fontRef idx="minor"/>
+        </p:style>
+        <p:txBody>
+          <a:bodyPr lIns="90000" rIns="90000" tIns="45000" bIns="45000" anchor="t">
+            <a:noAutofit/>
+          </a:bodyPr>
+          <a:p>
+            <a:pPr>
+              <a:lnSpc>
+                <a:spcPct val="100000"/>
+              </a:lnSpc>
+            </a:pPr>
+            <a:r>
+              <a:rPr b="0" lang="en-US" sz="2000" spc="-1" strike="noStrike">
+                <a:solidFill>
+                  <a:srgbClr val="000000"/>
+                </a:solidFill>
+                <a:latin typeface="Arial"/>
+              </a:rPr>
+              <a:t>1. Создание мобильного и десктопного веб-клиентов</a:t>
+            </a:r>
+            <a:endParaRPr b="0" lang="en-US" sz="2000" spc="-1" strike="noStrike">
+              <a:solidFill>
+                <a:srgbClr val="000000"/>
+              </a:solidFill>
+              <a:latin typeface="Arial"/>
+            </a:endParaRPr>
+          </a:p>
+          <a:p>
+            <a:pPr>
+              <a:lnSpc>
+                <a:spcPct val="100000"/>
+              </a:lnSpc>
+            </a:pPr>
+            <a:r>
+              <a:rPr b="0" lang="en-US" sz="2000" spc="-1" strike="noStrike">
+                <a:solidFill>
+                  <a:srgbClr val="000000"/>
+                </a:solidFill>
+                <a:latin typeface="Arial"/>
+              </a:rPr>
+              <a:t>2. Интеграцию с внешними сервисами (например, YandexMaps для обозначения на карте событий)</a:t>
+            </a:r>
+            <a:endParaRPr b="0" lang="en-US" sz="2000" spc="-1" strike="noStrike">
+              <a:solidFill>
+                <a:srgbClr val="000000"/>
+              </a:solidFill>
+              <a:latin typeface="Arial"/>
+            </a:endParaRPr>
+          </a:p>
+          <a:p>
+            <a:pPr>
+              <a:lnSpc>
+                <a:spcPct val="100000"/>
+              </a:lnSpc>
+            </a:pPr>
+            <a:r>
+              <a:rPr b="0" lang="en-US" sz="2000" spc="-1" strike="noStrike">
+                <a:solidFill>
+                  <a:srgbClr val="000000"/>
+                </a:solidFill>
+                <a:latin typeface="Arial"/>
+              </a:rPr>
+              <a:t>3. Возможность расширения на другие города</a:t>
+            </a:r>
+            <a:endParaRPr b="0" lang="en-US" sz="2000" spc="-1" strike="noStrike">
+              <a:solidFill>
+                <a:srgbClr val="000000"/>
+              </a:solidFill>
+              <a:latin typeface="Arial"/>
+            </a:endParaRPr>
+          </a:p>
+        </p:txBody>
+      </p:sp>
     </p:spTree>
   </p:cSld>
   <mc:AlternateContent>
@@ -2342,7 +2981,7 @@
       </p:grpSpPr>
       <p:sp>
         <p:nvSpPr>
-          <p:cNvPr id="26" name="PlaceHolder 1"/>
+          <p:cNvPr id="31" name="PlaceHolder 1"/>
           <p:cNvSpPr>
             <a:spLocks noGrp="1"/>
           </p:cNvSpPr>
@@ -2352,8 +2991,8 @@
         </p:nvSpPr>
         <p:spPr>
           <a:xfrm>
-            <a:off x="457200" y="2286000"/>
-            <a:ext cx="4525200" cy="1250280"/>
+            <a:off x="504000" y="226080"/>
+            <a:ext cx="9070560" cy="945360"/>
           </a:xfrm>
           <a:prstGeom prst="rect">
             <a:avLst/>
@@ -2369,51 +3008,403 @@
           </a:bodyPr>
           <a:p>
             <a:pPr indent="0" algn="ctr">
+              <a:lnSpc>
+                <a:spcPct val="100000"/>
+              </a:lnSpc>
               <a:buNone/>
-            </a:pPr>
-            <a:r>
-              <a:rPr b="0" lang="en-US" sz="4400" strike="noStrike" u="none">
-                <a:solidFill>
-                  <a:srgbClr val="000000"/>
-                </a:solidFill>
-                <a:uFillTx/>
+              <a:tabLst>
+                <a:tab algn="l" pos="0"/>
+              </a:tabLst>
+            </a:pPr>
+            <a:r>
+              <a:rPr b="0" lang="en-US" sz="4400" spc="-1" strike="noStrike">
+                <a:solidFill>
+                  <a:srgbClr val="000000"/>
+                </a:solidFill>
                 <a:latin typeface="Arial"/>
               </a:rPr>
               <a:t>Использованные источники</a:t>
             </a:r>
-            <a:endParaRPr b="0" lang="en-US" sz="4400" strike="noStrike" u="none">
-              <a:solidFill>
-                <a:srgbClr val="000000"/>
-              </a:solidFill>
-              <a:uFillTx/>
+            <a:endParaRPr b="0" lang="en-US" sz="4400" spc="-1" strike="noStrike">
+              <a:solidFill>
+                <a:srgbClr val="000000"/>
+              </a:solidFill>
               <a:latin typeface="Arial"/>
             </a:endParaRPr>
           </a:p>
         </p:txBody>
       </p:sp>
-      <p:pic>
-        <p:nvPicPr>
-          <p:cNvPr id="27" name="" descr=""/>
-          <p:cNvPicPr/>
+      <p:sp>
+        <p:nvSpPr>
+          <p:cNvPr id="32" name=""/>
+          <p:cNvSpPr/>
           <p:nvPr/>
-        </p:nvPicPr>
-        <p:blipFill>
-          <a:blip r:embed="rId1"/>
-          <a:stretch/>
-        </p:blipFill>
+        </p:nvSpPr>
         <p:spPr>
           <a:xfrm>
-            <a:off x="5637240" y="228600"/>
-            <a:ext cx="3963960" cy="5212440"/>
+            <a:off x="457200" y="1143000"/>
+            <a:ext cx="9143640" cy="4114440"/>
           </a:xfrm>
           <a:prstGeom prst="rect">
             <a:avLst/>
           </a:prstGeom>
+          <a:noFill/>
           <a:ln w="0">
             <a:noFill/>
           </a:ln>
         </p:spPr>
-      </p:pic>
+        <p:style>
+          <a:lnRef idx="0"/>
+          <a:fillRef idx="0"/>
+          <a:effectRef idx="0"/>
+          <a:fontRef idx="minor"/>
+        </p:style>
+        <p:txBody>
+          <a:bodyPr lIns="90000" rIns="90000" tIns="45000" bIns="45000" anchor="t">
+            <a:noAutofit/>
+          </a:bodyPr>
+          <a:p>
+            <a:pPr marL="216000" indent="-216000">
+              <a:lnSpc>
+                <a:spcPct val="100000"/>
+              </a:lnSpc>
+              <a:buClr>
+                <a:srgbClr val="000000"/>
+              </a:buClr>
+              <a:buFont typeface="OpenSymbol"/>
+              <a:buAutoNum type="arabicParenR"/>
+            </a:pPr>
+            <a:r>
+              <a:rPr b="0" lang="en-US" sz="1300" spc="-1" strike="noStrike">
+                <a:solidFill>
+                  <a:srgbClr val="000000"/>
+                </a:solidFill>
+                <a:latin typeface="Arial"/>
+                <a:ea typeface="DejaVu Sans"/>
+              </a:rPr>
+              <a:t>Ramirez, S. Fastapi: Modern, fast (high-performance), web framework for building apis with python 3.7+ based on standard python type hints [Электронный ресурс]. — URL: https://fastapi.tiangolo.com/. — (Дата обращения 15.09.2024) Загл. с экр. Яз. англ.</a:t>
+            </a:r>
+            <a:endParaRPr b="0" lang="en-US" sz="1300" spc="-1" strike="noStrike">
+              <a:solidFill>
+                <a:srgbClr val="000000"/>
+              </a:solidFill>
+              <a:latin typeface="Arial"/>
+            </a:endParaRPr>
+          </a:p>
+          <a:p>
+            <a:pPr marL="216000" indent="-216000">
+              <a:lnSpc>
+                <a:spcPct val="100000"/>
+              </a:lnSpc>
+              <a:buClr>
+                <a:srgbClr val="000000"/>
+              </a:buClr>
+              <a:buFont typeface="OpenSymbol"/>
+              <a:buAutoNum type="arabicParenR"/>
+            </a:pPr>
+            <a:r>
+              <a:rPr b="0" lang="en-US" sz="1300" spc="-1" strike="noStrike">
+                <a:solidFill>
+                  <a:srgbClr val="000000"/>
+                </a:solidFill>
+                <a:latin typeface="Arial"/>
+                <a:ea typeface="DejaVu Sans"/>
+              </a:rPr>
+              <a:t>Christie, T. Uvicorn: The lightning-fast asgi server implementation, using ‘uvloop‘ and ‘httptools‘ [Электронный ресурс]. — </a:t>
+            </a:r>
+            <a:r>
+              <a:rPr b="0" lang="en-US" sz="1300" spc="-1" strike="noStrike" u="sng">
+                <a:solidFill>
+                  <a:srgbClr val="0000ee"/>
+                </a:solidFill>
+                <a:uFillTx/>
+                <a:latin typeface="Arial"/>
+                <a:ea typeface="DejaVu Sans"/>
+                <a:hlinkClick r:id="rId1"/>
+              </a:rPr>
+              <a:t>https://www.uvicorn</a:t>
+            </a:r>
+            <a:r>
+              <a:rPr b="0" lang="en-US" sz="1300" spc="-1" strike="noStrike">
+                <a:solidFill>
+                  <a:srgbClr val="000000"/>
+                </a:solidFill>
+                <a:latin typeface="Arial"/>
+                <a:ea typeface="DejaVu Sans"/>
+              </a:rPr>
+              <a:t>.org/. — (Дата обращения 15.09.2024) Загл. с экр. Яз. Англ. </a:t>
+            </a:r>
+            <a:endParaRPr b="0" lang="en-US" sz="1300" spc="-1" strike="noStrike">
+              <a:solidFill>
+                <a:srgbClr val="000000"/>
+              </a:solidFill>
+              <a:latin typeface="Arial"/>
+            </a:endParaRPr>
+          </a:p>
+          <a:p>
+            <a:pPr marL="216000" indent="-216000">
+              <a:lnSpc>
+                <a:spcPct val="100000"/>
+              </a:lnSpc>
+              <a:buClr>
+                <a:srgbClr val="000000"/>
+              </a:buClr>
+              <a:buFont typeface="OpenSymbol"/>
+              <a:buAutoNum type="arabicParenR"/>
+            </a:pPr>
+            <a:r>
+              <a:rPr b="0" lang="en-US" sz="1300" spc="-1" strike="noStrike">
+                <a:solidFill>
+                  <a:srgbClr val="000000"/>
+                </a:solidFill>
+                <a:latin typeface="Arial"/>
+                <a:ea typeface="DejaVu Sans"/>
+              </a:rPr>
+              <a:t>Bayer, M. Alembic: A database migrations tool for sqlalchemy [Электронный ресурс]. — https://alembic.sqlalchemy.org/. — (Дата обращения 26.09.2024) Загл. с экр. Яз. англ.</a:t>
+            </a:r>
+            <a:endParaRPr b="0" lang="en-US" sz="1300" spc="-1" strike="noStrike">
+              <a:solidFill>
+                <a:srgbClr val="000000"/>
+              </a:solidFill>
+              <a:latin typeface="Arial"/>
+            </a:endParaRPr>
+          </a:p>
+          <a:p>
+            <a:pPr marL="216000" indent="-216000">
+              <a:lnSpc>
+                <a:spcPct val="100000"/>
+              </a:lnSpc>
+              <a:buClr>
+                <a:srgbClr val="000000"/>
+              </a:buClr>
+              <a:buFont typeface="OpenSymbol"/>
+              <a:buAutoNum type="arabicParenR"/>
+            </a:pPr>
+            <a:r>
+              <a:rPr b="0" lang="en-US" sz="1300" spc="-1" strike="noStrike">
+                <a:solidFill>
+                  <a:srgbClr val="000000"/>
+                </a:solidFill>
+                <a:latin typeface="Arial"/>
+                <a:ea typeface="DejaVu Sans"/>
+              </a:rPr>
+              <a:t>Bayer, M. Sqlalchemy documentation [Электронный ресурс]. — URL: https://docs.sqlalchemy.org/. — (Дата обращения 17.09.2024) Загл. с экр. Яз. англ.</a:t>
+            </a:r>
+            <a:endParaRPr b="0" lang="en-US" sz="1300" spc="-1" strike="noStrike">
+              <a:solidFill>
+                <a:srgbClr val="000000"/>
+              </a:solidFill>
+              <a:latin typeface="Arial"/>
+            </a:endParaRPr>
+          </a:p>
+          <a:p>
+            <a:pPr marL="216000" indent="-216000">
+              <a:lnSpc>
+                <a:spcPct val="100000"/>
+              </a:lnSpc>
+              <a:buClr>
+                <a:srgbClr val="000000"/>
+              </a:buClr>
+              <a:buFont typeface="OpenSymbol"/>
+              <a:buAutoNum type="arabicParenR"/>
+            </a:pPr>
+            <a:r>
+              <a:rPr b="0" lang="en-US" sz="1300" spc="-1" strike="noStrike">
+                <a:solidFill>
+                  <a:srgbClr val="000000"/>
+                </a:solidFill>
+                <a:latin typeface="Arial"/>
+                <a:ea typeface="DejaVu Sans"/>
+              </a:rPr>
+              <a:t>Group, P. G. D. Postgresql documentation [Электронный ресурс]. — https://www.postgresql.org/docs/. — (Дата обращения 18.09.2024) Загл. с экр.Яз. англ.</a:t>
+            </a:r>
+            <a:endParaRPr b="0" lang="en-US" sz="1300" spc="-1" strike="noStrike">
+              <a:solidFill>
+                <a:srgbClr val="000000"/>
+              </a:solidFill>
+              <a:latin typeface="Arial"/>
+            </a:endParaRPr>
+          </a:p>
+          <a:p>
+            <a:pPr marL="216000" indent="-216000">
+              <a:lnSpc>
+                <a:spcPct val="100000"/>
+              </a:lnSpc>
+              <a:buClr>
+                <a:srgbClr val="000000"/>
+              </a:buClr>
+              <a:buFont typeface="OpenSymbol"/>
+              <a:buAutoNum type="arabicParenR"/>
+            </a:pPr>
+            <a:r>
+              <a:rPr b="0" lang="en-US" sz="1300" spc="-1" strike="noStrike">
+                <a:solidFill>
+                  <a:srgbClr val="000000"/>
+                </a:solidFill>
+                <a:latin typeface="Arial"/>
+                <a:ea typeface="DejaVu Sans"/>
+              </a:rPr>
+              <a:t>Frazelle, J. Docker: Up and Running / J. Frazelle. — O’Reilly Media, 2015. </a:t>
+            </a:r>
+            <a:endParaRPr b="0" lang="en-US" sz="1300" spc="-1" strike="noStrike">
+              <a:solidFill>
+                <a:srgbClr val="000000"/>
+              </a:solidFill>
+              <a:latin typeface="Arial"/>
+            </a:endParaRPr>
+          </a:p>
+          <a:p>
+            <a:pPr marL="216000" indent="-216000">
+              <a:lnSpc>
+                <a:spcPct val="100000"/>
+              </a:lnSpc>
+              <a:buClr>
+                <a:srgbClr val="000000"/>
+              </a:buClr>
+              <a:buFont typeface="OpenSymbol"/>
+              <a:buAutoNum type="arabicParenR"/>
+            </a:pPr>
+            <a:r>
+              <a:rPr b="0" lang="en-US" sz="1300" spc="-1" strike="noStrike">
+                <a:solidFill>
+                  <a:srgbClr val="000000"/>
+                </a:solidFill>
+                <a:latin typeface="Arial"/>
+                <a:ea typeface="DejaVu Sans"/>
+              </a:rPr>
+              <a:t>Labs, P. Postman api platform [Электронный ресурс]. — URL: https://www.postman.com/. — (Дата обращения 17.10.2024) Загл. с экр. Яз. англ.</a:t>
+            </a:r>
+            <a:endParaRPr b="0" lang="en-US" sz="1300" spc="-1" strike="noStrike">
+              <a:solidFill>
+                <a:srgbClr val="000000"/>
+              </a:solidFill>
+              <a:latin typeface="Arial"/>
+            </a:endParaRPr>
+          </a:p>
+          <a:p>
+            <a:pPr marL="216000" indent="-216000">
+              <a:lnSpc>
+                <a:spcPct val="100000"/>
+              </a:lnSpc>
+              <a:buClr>
+                <a:srgbClr val="000000"/>
+              </a:buClr>
+              <a:buFont typeface="OpenSymbol"/>
+              <a:buAutoNum type="arabicParenR"/>
+            </a:pPr>
+            <a:r>
+              <a:rPr b="0" lang="en-US" sz="1300" spc="-1" strike="noStrike">
+                <a:solidFill>
+                  <a:srgbClr val="000000"/>
+                </a:solidFill>
+                <a:latin typeface="Arial"/>
+                <a:ea typeface="DejaVu Sans"/>
+              </a:rPr>
+              <a:t>Community, D. Dbeaver: Universal database tool [Электронный ресурс]. — URL: https://dbeaver.io/. — (Дата обращения 25.09.2024) Загл. с экр. Яз. англ.</a:t>
+            </a:r>
+            <a:endParaRPr b="0" lang="en-US" sz="1300" spc="-1" strike="noStrike">
+              <a:solidFill>
+                <a:srgbClr val="000000"/>
+              </a:solidFill>
+              <a:latin typeface="Arial"/>
+            </a:endParaRPr>
+          </a:p>
+          <a:p>
+            <a:pPr marL="216000" indent="-216000">
+              <a:lnSpc>
+                <a:spcPct val="100000"/>
+              </a:lnSpc>
+              <a:buClr>
+                <a:srgbClr val="000000"/>
+              </a:buClr>
+              <a:buFont typeface="OpenSymbol"/>
+              <a:buAutoNum type="arabicParenR"/>
+            </a:pPr>
+            <a:r>
+              <a:rPr b="0" lang="en-US" sz="1300" spc="-1" strike="noStrike">
+                <a:solidFill>
+                  <a:srgbClr val="000000"/>
+                </a:solidFill>
+                <a:latin typeface="Arial"/>
+                <a:ea typeface="DejaVu Sans"/>
+              </a:rPr>
+              <a:t>Richardson, L. RESTful Web APIs / L. Richardson, M. Amundsen, S. Ruby. — O’Reilly Media, 2013.</a:t>
+            </a:r>
+            <a:endParaRPr b="0" lang="en-US" sz="1300" spc="-1" strike="noStrike">
+              <a:solidFill>
+                <a:srgbClr val="000000"/>
+              </a:solidFill>
+              <a:latin typeface="Arial"/>
+            </a:endParaRPr>
+          </a:p>
+          <a:p>
+            <a:pPr marL="216000" indent="-216000">
+              <a:lnSpc>
+                <a:spcPct val="100000"/>
+              </a:lnSpc>
+              <a:buClr>
+                <a:srgbClr val="000000"/>
+              </a:buClr>
+              <a:buFont typeface="OpenSymbol"/>
+              <a:buAutoNum type="arabicParenR"/>
+            </a:pPr>
+            <a:r>
+              <a:rPr b="0" lang="en-US" sz="1300" spc="-1" strike="noStrike">
+                <a:solidFill>
+                  <a:srgbClr val="000000"/>
+                </a:solidFill>
+                <a:latin typeface="Arial"/>
+                <a:ea typeface="DejaVu Sans"/>
+              </a:rPr>
+              <a:t>Auth0,. Json web tokens (jwt): Introduction [Электронный ресурс]. — https://jwt.io/introduction/. — (Дата обращения 29.09.2024) Загл. с экр. Яз. англ.</a:t>
+            </a:r>
+            <a:endParaRPr b="0" lang="en-US" sz="1300" spc="-1" strike="noStrike">
+              <a:solidFill>
+                <a:srgbClr val="000000"/>
+              </a:solidFill>
+              <a:latin typeface="Arial"/>
+            </a:endParaRPr>
+          </a:p>
+          <a:p>
+            <a:pPr marL="216000" indent="-216000">
+              <a:lnSpc>
+                <a:spcPct val="100000"/>
+              </a:lnSpc>
+              <a:buClr>
+                <a:srgbClr val="000000"/>
+              </a:buClr>
+              <a:buFont typeface="OpenSymbol"/>
+              <a:buAutoNum type="arabicParenR"/>
+            </a:pPr>
+            <a:r>
+              <a:rPr b="0" lang="en-US" sz="1300" spc="-1" strike="noStrike">
+                <a:solidFill>
+                  <a:srgbClr val="000000"/>
+                </a:solidFill>
+                <a:latin typeface="Arial"/>
+                <a:ea typeface="DejaVu Sans"/>
+              </a:rPr>
+              <a:t> </a:t>
+            </a:r>
+            <a:r>
+              <a:rPr b="0" lang="en-US" sz="1300" spc="-1" strike="noStrike">
+                <a:solidFill>
+                  <a:srgbClr val="000000"/>
+                </a:solidFill>
+                <a:latin typeface="Arial"/>
+                <a:ea typeface="DejaVu Sans"/>
+              </a:rPr>
+              <a:t>Parecki, A. OAuth 2.0 Simplified / A. Parecki. — O’Reilly Media, 2017.</a:t>
+            </a:r>
+            <a:endParaRPr b="0" lang="en-US" sz="1300" spc="-1" strike="noStrike">
+              <a:solidFill>
+                <a:srgbClr val="000000"/>
+              </a:solidFill>
+              <a:latin typeface="Arial"/>
+            </a:endParaRPr>
+          </a:p>
+        </p:txBody>
+      </p:sp>
     </p:spTree>
   </p:cSld>
   <mc:AlternateContent>
@@ -2531,4 +3522,110 @@
     </a:fmtScheme>
   </a:themeElements>
 </a:theme>
+</file>
+
+<file path=ppt/theme/theme2.xml><?xml version="1.0" encoding="utf-8"?>
+<a:theme xmlns:a="http://schemas.openxmlformats.org/drawingml/2006/main" xmlns:r="http://schemas.openxmlformats.org/officeDocument/2006/relationships" name="Office">
+  <a:themeElements>
+    <a:clrScheme name="LibreOffice">
+      <a:dk1>
+        <a:srgbClr val="000000"/>
+      </a:dk1>
+      <a:lt1>
+        <a:srgbClr val="ffffff"/>
+      </a:lt1>
+      <a:dk2>
+        <a:srgbClr val="000000"/>
+      </a:dk2>
+      <a:lt2>
+        <a:srgbClr val="ffffff"/>
+      </a:lt2>
+      <a:accent1>
+        <a:srgbClr val="18a303"/>
+      </a:accent1>
+      <a:accent2>
+        <a:srgbClr val="0369a3"/>
+      </a:accent2>
+      <a:accent3>
+        <a:srgbClr val="a33e03"/>
+      </a:accent3>
+      <a:accent4>
+        <a:srgbClr val="8e03a3"/>
+      </a:accent4>
+      <a:accent5>
+        <a:srgbClr val="c99c00"/>
+      </a:accent5>
+      <a:accent6>
+        <a:srgbClr val="c9211e"/>
+      </a:accent6>
+      <a:hlink>
+        <a:srgbClr val="0000ee"/>
+      </a:hlink>
+      <a:folHlink>
+        <a:srgbClr val="551a8b"/>
+      </a:folHlink>
+    </a:clrScheme>
+    <a:fontScheme name="Office">
+      <a:majorFont>
+        <a:latin typeface="Arial" pitchFamily="0" charset="1"/>
+        <a:ea typeface="DejaVu Sans" pitchFamily="0" charset="1"/>
+        <a:cs typeface="DejaVu Sans" pitchFamily="0" charset="1"/>
+      </a:majorFont>
+      <a:minorFont>
+        <a:latin typeface="Arial" pitchFamily="0" charset="1"/>
+        <a:ea typeface="DejaVu Sans" pitchFamily="0" charset="1"/>
+        <a:cs typeface="DejaVu Sans" pitchFamily="0" charset="1"/>
+      </a:minorFont>
+    </a:fontScheme>
+    <a:fmtScheme>
+      <a:fillStyleLst>
+        <a:solidFill>
+          <a:schemeClr val="phClr"/>
+        </a:solidFill>
+        <a:solidFill>
+          <a:schemeClr val="phClr"/>
+        </a:solidFill>
+        <a:solidFill>
+          <a:schemeClr val="phClr"/>
+        </a:solidFill>
+      </a:fillStyleLst>
+      <a:lnStyleLst>
+        <a:ln w="6350" cap="flat" cmpd="sng" algn="ctr">
+          <a:prstDash val="solid"/>
+          <a:miter/>
+        </a:ln>
+        <a:ln w="6350" cap="flat" cmpd="sng" algn="ctr">
+          <a:prstDash val="solid"/>
+          <a:miter/>
+        </a:ln>
+        <a:ln w="6350" cap="flat" cmpd="sng" algn="ctr">
+          <a:prstDash val="solid"/>
+          <a:miter/>
+        </a:ln>
+      </a:lnStyleLst>
+      <a:effectStyleLst>
+        <a:effectStyle>
+          <a:effectLst/>
+        </a:effectStyle>
+        <a:effectStyle>
+          <a:effectLst/>
+        </a:effectStyle>
+        <a:effectStyle>
+          <a:effectLst/>
+        </a:effectStyle>
+      </a:effectStyleLst>
+      <a:bgFillStyleLst>
+        <a:solidFill>
+          <a:schemeClr val="phClr"/>
+        </a:solidFill>
+        <a:solidFill>
+          <a:schemeClr val="phClr"/>
+        </a:solidFill>
+        <a:solidFill>
+          <a:schemeClr val="phClr"/>
+        </a:solidFill>
+      </a:bgFillStyleLst>
+    </a:fmtScheme>
+  </a:themeElements>
+</a:theme>
 </file>
</xml_diff>